<commit_message>
Update EDA_LendingClub_Slides - Project 2.pptx
</commit_message>
<xml_diff>
--- a/Project2/EDA_LendingClub_Slides - Project 2.pptx
+++ b/Project2/EDA_LendingClub_Slides - Project 2.pptx
@@ -5,7 +5,7 @@
     <p:sldMasterId id="2147483648" r:id="rId1"/>
   </p:sldMasterIdLst>
   <p:notesMasterIdLst>
-    <p:notesMasterId r:id="rId20"/>
+    <p:notesMasterId r:id="rId28"/>
   </p:notesMasterIdLst>
   <p:sldIdLst>
     <p:sldId id="257" r:id="rId2"/>
@@ -17,15 +17,23 @@
     <p:sldId id="296" r:id="rId8"/>
     <p:sldId id="297" r:id="rId9"/>
     <p:sldId id="298" r:id="rId10"/>
-    <p:sldId id="268" r:id="rId11"/>
-    <p:sldId id="273" r:id="rId12"/>
-    <p:sldId id="274" r:id="rId13"/>
-    <p:sldId id="275" r:id="rId14"/>
-    <p:sldId id="281" r:id="rId15"/>
-    <p:sldId id="299" r:id="rId16"/>
-    <p:sldId id="300" r:id="rId17"/>
-    <p:sldId id="301" r:id="rId18"/>
-    <p:sldId id="263" r:id="rId19"/>
+    <p:sldId id="302" r:id="rId11"/>
+    <p:sldId id="268" r:id="rId12"/>
+    <p:sldId id="273" r:id="rId13"/>
+    <p:sldId id="274" r:id="rId14"/>
+    <p:sldId id="275" r:id="rId15"/>
+    <p:sldId id="281" r:id="rId16"/>
+    <p:sldId id="299" r:id="rId17"/>
+    <p:sldId id="303" r:id="rId18"/>
+    <p:sldId id="304" r:id="rId19"/>
+    <p:sldId id="305" r:id="rId20"/>
+    <p:sldId id="306" r:id="rId21"/>
+    <p:sldId id="307" r:id="rId22"/>
+    <p:sldId id="308" r:id="rId23"/>
+    <p:sldId id="309" r:id="rId24"/>
+    <p:sldId id="300" r:id="rId25"/>
+    <p:sldId id="301" r:id="rId26"/>
+    <p:sldId id="263" r:id="rId27"/>
   </p:sldIdLst>
   <p:sldSz cx="12192000" cy="6858000"/>
   <p:notesSz cx="6858000" cy="9144000"/>
@@ -214,7 +222,7 @@
           <a:p>
             <a:fld id="{48CCDE1B-485C-4B2F-BE21-3D867E8608CA}" type="datetimeFigureOut">
               <a:rPr lang="en-US" smtClean="0"/>
-              <a:t>12/9/2022</a:t>
+              <a:t>12/10/2022</a:t>
             </a:fld>
             <a:endParaRPr lang="en-US"/>
           </a:p>
@@ -964,19 +972,7 @@
           <a:bodyPr/>
           <a:lstStyle/>
           <a:p>
-            <a:r>
-              <a:rPr lang="en-US" dirty="0"/>
-              <a:t>From this we can see that about 13.2% of borrowers who met the credit underwriting criteria did not fully pay, while for the borrowers who did not meet the credit underwriting criteria about 27.8% did not fully pay.</a:t>
-            </a:r>
-          </a:p>
-          <a:p>
             <a:endParaRPr lang="en-US" dirty="0"/>
-          </a:p>
-          <a:p>
-            <a:r>
-              <a:rPr lang="en-US" dirty="0"/>
-              <a:t>This indicates borrowers who did not meet the credit underwriting criteria were almost twice as likely to be default on their loans than those who did meet the criteria. For comparison, default rates on loans from commercial banks for the same period as our dataset averaged 4.48%, with a maximum default rate of 7.49% default rate towards the end of 2009, according to the St. Louis Federal Reserve Bank.</a:t>
-            </a:r>
           </a:p>
         </p:txBody>
       </p:sp>
@@ -997,7 +993,187 @@
           <a:p>
             <a:fld id="{6B053770-FD16-42CB-98BB-967786CBD56A}" type="slidenum">
               <a:rPr lang="en-US" smtClean="0"/>
+              <a:t>9</a:t>
+            </a:fld>
+            <a:endParaRPr lang="en-US"/>
+          </a:p>
+        </p:txBody>
+      </p:sp>
+    </p:spTree>
+    <p:extLst>
+      <p:ext uri="{BB962C8B-B14F-4D97-AF65-F5344CB8AC3E}">
+        <p14:creationId xmlns:p14="http://schemas.microsoft.com/office/powerpoint/2010/main" val="2153594973"/>
+      </p:ext>
+    </p:extLst>
+  </p:cSld>
+  <p:clrMapOvr>
+    <a:masterClrMapping/>
+  </p:clrMapOvr>
+</p:notes>
+</file>
+
+<file path=ppt/notesSlides/notesSlide5.xml><?xml version="1.0" encoding="utf-8"?>
+<p:notes xmlns:a="http://schemas.openxmlformats.org/drawingml/2006/main" xmlns:r="http://schemas.openxmlformats.org/officeDocument/2006/relationships" xmlns:p="http://schemas.openxmlformats.org/presentationml/2006/main">
+  <p:cSld>
+    <p:spTree>
+      <p:nvGrpSpPr>
+        <p:cNvPr id="1" name=""/>
+        <p:cNvGrpSpPr/>
+        <p:nvPr/>
+      </p:nvGrpSpPr>
+      <p:grpSpPr>
+        <a:xfrm>
+          <a:off x="0" y="0"/>
+          <a:ext cx="0" cy="0"/>
+          <a:chOff x="0" y="0"/>
+          <a:chExt cx="0" cy="0"/>
+        </a:xfrm>
+      </p:grpSpPr>
+      <p:sp>
+        <p:nvSpPr>
+          <p:cNvPr id="2" name="Slide Image Placeholder 1"/>
+          <p:cNvSpPr>
+            <a:spLocks noGrp="1" noRot="1" noChangeAspect="1"/>
+          </p:cNvSpPr>
+          <p:nvPr>
+            <p:ph type="sldImg"/>
+          </p:nvPr>
+        </p:nvSpPr>
+        <p:spPr/>
+      </p:sp>
+      <p:sp>
+        <p:nvSpPr>
+          <p:cNvPr id="3" name="Notes Placeholder 2"/>
+          <p:cNvSpPr>
+            <a:spLocks noGrp="1"/>
+          </p:cNvSpPr>
+          <p:nvPr>
+            <p:ph type="body" idx="1"/>
+          </p:nvPr>
+        </p:nvSpPr>
+        <p:spPr/>
+        <p:txBody>
+          <a:bodyPr/>
+          <a:lstStyle/>
+          <a:p>
+            <a:endParaRPr lang="en-US" dirty="0"/>
+          </a:p>
+        </p:txBody>
+      </p:sp>
+      <p:sp>
+        <p:nvSpPr>
+          <p:cNvPr id="4" name="Slide Number Placeholder 3"/>
+          <p:cNvSpPr>
+            <a:spLocks noGrp="1"/>
+          </p:cNvSpPr>
+          <p:nvPr>
+            <p:ph type="sldNum" sz="quarter" idx="5"/>
+          </p:nvPr>
+        </p:nvSpPr>
+        <p:spPr/>
+        <p:txBody>
+          <a:bodyPr/>
+          <a:lstStyle/>
+          <a:p>
+            <a:fld id="{6B053770-FD16-42CB-98BB-967786CBD56A}" type="slidenum">
+              <a:rPr lang="en-US" smtClean="0"/>
               <a:t>10</a:t>
+            </a:fld>
+            <a:endParaRPr lang="en-US"/>
+          </a:p>
+        </p:txBody>
+      </p:sp>
+    </p:spTree>
+    <p:extLst>
+      <p:ext uri="{BB962C8B-B14F-4D97-AF65-F5344CB8AC3E}">
+        <p14:creationId xmlns:p14="http://schemas.microsoft.com/office/powerpoint/2010/main" val="3715633435"/>
+      </p:ext>
+    </p:extLst>
+  </p:cSld>
+  <p:clrMapOvr>
+    <a:masterClrMapping/>
+  </p:clrMapOvr>
+</p:notes>
+</file>
+
+<file path=ppt/notesSlides/notesSlide6.xml><?xml version="1.0" encoding="utf-8"?>
+<p:notes xmlns:a="http://schemas.openxmlformats.org/drawingml/2006/main" xmlns:r="http://schemas.openxmlformats.org/officeDocument/2006/relationships" xmlns:p="http://schemas.openxmlformats.org/presentationml/2006/main">
+  <p:cSld>
+    <p:spTree>
+      <p:nvGrpSpPr>
+        <p:cNvPr id="1" name=""/>
+        <p:cNvGrpSpPr/>
+        <p:nvPr/>
+      </p:nvGrpSpPr>
+      <p:grpSpPr>
+        <a:xfrm>
+          <a:off x="0" y="0"/>
+          <a:ext cx="0" cy="0"/>
+          <a:chOff x="0" y="0"/>
+          <a:chExt cx="0" cy="0"/>
+        </a:xfrm>
+      </p:grpSpPr>
+      <p:sp>
+        <p:nvSpPr>
+          <p:cNvPr id="2" name="Slide Image Placeholder 1"/>
+          <p:cNvSpPr>
+            <a:spLocks noGrp="1" noRot="1" noChangeAspect="1"/>
+          </p:cNvSpPr>
+          <p:nvPr>
+            <p:ph type="sldImg"/>
+          </p:nvPr>
+        </p:nvSpPr>
+        <p:spPr/>
+      </p:sp>
+      <p:sp>
+        <p:nvSpPr>
+          <p:cNvPr id="3" name="Notes Placeholder 2"/>
+          <p:cNvSpPr>
+            <a:spLocks noGrp="1"/>
+          </p:cNvSpPr>
+          <p:nvPr>
+            <p:ph type="body" idx="1"/>
+          </p:nvPr>
+        </p:nvSpPr>
+        <p:spPr/>
+        <p:txBody>
+          <a:bodyPr/>
+          <a:lstStyle/>
+          <a:p>
+            <a:r>
+              <a:rPr lang="en-US" dirty="0"/>
+              <a:t>From this we can see that about 13.2% of borrowers who met the credit underwriting criteria did not fully pay, while for the borrowers who did not meet the credit underwriting criteria about 27.8% did not fully pay.</a:t>
+            </a:r>
+          </a:p>
+          <a:p>
+            <a:endParaRPr lang="en-US" dirty="0"/>
+          </a:p>
+          <a:p>
+            <a:r>
+              <a:rPr lang="en-US" dirty="0"/>
+              <a:t>This indicates borrowers who did not meet the credit underwriting criteria were almost twice as likely to be default on their loans than those who did meet the criteria. For comparison, default rates on loans from commercial banks for the same period as our dataset averaged 4.48%, with a maximum default rate of 7.49% default rate towards the end of 2009, according to the St. Louis Federal Reserve Bank.</a:t>
+            </a:r>
+          </a:p>
+        </p:txBody>
+      </p:sp>
+      <p:sp>
+        <p:nvSpPr>
+          <p:cNvPr id="4" name="Slide Number Placeholder 3"/>
+          <p:cNvSpPr>
+            <a:spLocks noGrp="1"/>
+          </p:cNvSpPr>
+          <p:nvPr>
+            <p:ph type="sldNum" sz="quarter" idx="5"/>
+          </p:nvPr>
+        </p:nvSpPr>
+        <p:spPr/>
+        <p:txBody>
+          <a:bodyPr/>
+          <a:lstStyle/>
+          <a:p>
+            <a:fld id="{6B053770-FD16-42CB-98BB-967786CBD56A}" type="slidenum">
+              <a:rPr lang="en-US" smtClean="0"/>
+              <a:t>11</a:t>
             </a:fld>
             <a:endParaRPr lang="en-US"/>
           </a:p>
@@ -1163,7 +1339,7 @@
           <a:p>
             <a:fld id="{995EAC03-283E-463E-BE2A-0031DB3AD91B}" type="datetimeFigureOut">
               <a:rPr lang="en-US" smtClean="0"/>
-              <a:t>12/9/2022</a:t>
+              <a:t>12/10/2022</a:t>
             </a:fld>
             <a:endParaRPr lang="en-US"/>
           </a:p>
@@ -1361,7 +1537,7 @@
           <a:p>
             <a:fld id="{995EAC03-283E-463E-BE2A-0031DB3AD91B}" type="datetimeFigureOut">
               <a:rPr lang="en-US" smtClean="0"/>
-              <a:t>12/9/2022</a:t>
+              <a:t>12/10/2022</a:t>
             </a:fld>
             <a:endParaRPr lang="en-US"/>
           </a:p>
@@ -1569,7 +1745,7 @@
           <a:p>
             <a:fld id="{995EAC03-283E-463E-BE2A-0031DB3AD91B}" type="datetimeFigureOut">
               <a:rPr lang="en-US" smtClean="0"/>
-              <a:t>12/9/2022</a:t>
+              <a:t>12/10/2022</a:t>
             </a:fld>
             <a:endParaRPr lang="en-US"/>
           </a:p>
@@ -1767,7 +1943,7 @@
           <a:p>
             <a:fld id="{995EAC03-283E-463E-BE2A-0031DB3AD91B}" type="datetimeFigureOut">
               <a:rPr lang="en-US" smtClean="0"/>
-              <a:t>12/9/2022</a:t>
+              <a:t>12/10/2022</a:t>
             </a:fld>
             <a:endParaRPr lang="en-US"/>
           </a:p>
@@ -2042,7 +2218,7 @@
           <a:p>
             <a:fld id="{995EAC03-283E-463E-BE2A-0031DB3AD91B}" type="datetimeFigureOut">
               <a:rPr lang="en-US" smtClean="0"/>
-              <a:t>12/9/2022</a:t>
+              <a:t>12/10/2022</a:t>
             </a:fld>
             <a:endParaRPr lang="en-US"/>
           </a:p>
@@ -2307,7 +2483,7 @@
           <a:p>
             <a:fld id="{995EAC03-283E-463E-BE2A-0031DB3AD91B}" type="datetimeFigureOut">
               <a:rPr lang="en-US" smtClean="0"/>
-              <a:t>12/9/2022</a:t>
+              <a:t>12/10/2022</a:t>
             </a:fld>
             <a:endParaRPr lang="en-US"/>
           </a:p>
@@ -2719,7 +2895,7 @@
           <a:p>
             <a:fld id="{995EAC03-283E-463E-BE2A-0031DB3AD91B}" type="datetimeFigureOut">
               <a:rPr lang="en-US" smtClean="0"/>
-              <a:t>12/9/2022</a:t>
+              <a:t>12/10/2022</a:t>
             </a:fld>
             <a:endParaRPr lang="en-US"/>
           </a:p>
@@ -2860,7 +3036,7 @@
           <a:p>
             <a:fld id="{995EAC03-283E-463E-BE2A-0031DB3AD91B}" type="datetimeFigureOut">
               <a:rPr lang="en-US" smtClean="0"/>
-              <a:t>12/9/2022</a:t>
+              <a:t>12/10/2022</a:t>
             </a:fld>
             <a:endParaRPr lang="en-US"/>
           </a:p>
@@ -2973,7 +3149,7 @@
           <a:p>
             <a:fld id="{995EAC03-283E-463E-BE2A-0031DB3AD91B}" type="datetimeFigureOut">
               <a:rPr lang="en-US" smtClean="0"/>
-              <a:t>12/9/2022</a:t>
+              <a:t>12/10/2022</a:t>
             </a:fld>
             <a:endParaRPr lang="en-US"/>
           </a:p>
@@ -3284,7 +3460,7 @@
           <a:p>
             <a:fld id="{995EAC03-283E-463E-BE2A-0031DB3AD91B}" type="datetimeFigureOut">
               <a:rPr lang="en-US" smtClean="0"/>
-              <a:t>12/9/2022</a:t>
+              <a:t>12/10/2022</a:t>
             </a:fld>
             <a:endParaRPr lang="en-US"/>
           </a:p>
@@ -3572,7 +3748,7 @@
           <a:p>
             <a:fld id="{995EAC03-283E-463E-BE2A-0031DB3AD91B}" type="datetimeFigureOut">
               <a:rPr lang="en-US" smtClean="0"/>
-              <a:t>12/9/2022</a:t>
+              <a:t>12/10/2022</a:t>
             </a:fld>
             <a:endParaRPr lang="en-US"/>
           </a:p>
@@ -3813,7 +3989,7 @@
           <a:p>
             <a:fld id="{995EAC03-283E-463E-BE2A-0031DB3AD91B}" type="datetimeFigureOut">
               <a:rPr lang="en-US" smtClean="0"/>
-              <a:t>12/9/2022</a:t>
+              <a:t>12/10/2022</a:t>
             </a:fld>
             <a:endParaRPr lang="en-US"/>
           </a:p>
@@ -5590,6 +5766,248 @@
                   <a:srgbClr val="002060"/>
                 </a:solidFill>
               </a:rPr>
+              <a:t>Classification Tree – ROC Curve</a:t>
+            </a:r>
+          </a:p>
+        </p:txBody>
+      </p:sp>
+      <p:cxnSp>
+        <p:nvCxnSpPr>
+          <p:cNvPr id="9" name="Straight Connector 8">
+            <a:extLst>
+              <a:ext uri="{FF2B5EF4-FFF2-40B4-BE49-F238E27FC236}">
+                <a16:creationId xmlns:a16="http://schemas.microsoft.com/office/drawing/2014/main" id="{450EE6D2-7381-B11A-A20A-0D5D0904DD35}"/>
+              </a:ext>
+            </a:extLst>
+          </p:cNvPr>
+          <p:cNvCxnSpPr>
+            <a:cxnSpLocks/>
+          </p:cNvCxnSpPr>
+          <p:nvPr/>
+        </p:nvCxnSpPr>
+        <p:spPr>
+          <a:xfrm>
+            <a:off x="757647" y="1332033"/>
+            <a:ext cx="10659291" cy="0"/>
+          </a:xfrm>
+          <a:prstGeom prst="line">
+            <a:avLst/>
+          </a:prstGeom>
+          <a:ln w="57150">
+            <a:solidFill>
+              <a:srgbClr val="002060"/>
+            </a:solidFill>
+          </a:ln>
+        </p:spPr>
+        <p:style>
+          <a:lnRef idx="1">
+            <a:schemeClr val="accent1"/>
+          </a:lnRef>
+          <a:fillRef idx="0">
+            <a:schemeClr val="accent1"/>
+          </a:fillRef>
+          <a:effectRef idx="0">
+            <a:schemeClr val="accent1"/>
+          </a:effectRef>
+          <a:fontRef idx="minor">
+            <a:schemeClr val="tx1"/>
+          </a:fontRef>
+        </p:style>
+      </p:cxnSp>
+      <p:pic>
+        <p:nvPicPr>
+          <p:cNvPr id="4" name="Picture 3" descr="A picture containing chart&#10;&#10;Description automatically generated">
+            <a:extLst>
+              <a:ext uri="{FF2B5EF4-FFF2-40B4-BE49-F238E27FC236}">
+                <a16:creationId xmlns:a16="http://schemas.microsoft.com/office/drawing/2014/main" id="{42D988EC-5A0B-5693-5FAE-64380A8B7603}"/>
+              </a:ext>
+            </a:extLst>
+          </p:cNvPr>
+          <p:cNvPicPr>
+            <a:picLocks noChangeAspect="1"/>
+          </p:cNvPicPr>
+          <p:nvPr/>
+        </p:nvPicPr>
+        <p:blipFill>
+          <a:blip r:embed="rId4">
+            <a:extLst>
+              <a:ext uri="{28A0092B-C50C-407E-A947-70E740481C1C}">
+                <a14:useLocalDpi xmlns:a14="http://schemas.microsoft.com/office/drawing/2010/main" val="0"/>
+              </a:ext>
+            </a:extLst>
+          </a:blip>
+          <a:stretch>
+            <a:fillRect/>
+          </a:stretch>
+        </p:blipFill>
+        <p:spPr>
+          <a:xfrm>
+            <a:off x="2738999" y="1520901"/>
+            <a:ext cx="6400847" cy="4572033"/>
+          </a:xfrm>
+          <a:prstGeom prst="rect">
+            <a:avLst/>
+          </a:prstGeom>
+        </p:spPr>
+      </p:pic>
+      <p:sp>
+        <p:nvSpPr>
+          <p:cNvPr id="8" name="TextBox 7">
+            <a:extLst>
+              <a:ext uri="{FF2B5EF4-FFF2-40B4-BE49-F238E27FC236}">
+                <a16:creationId xmlns:a16="http://schemas.microsoft.com/office/drawing/2014/main" id="{2DBF58F3-7E65-6D50-C337-8940DA3DC74A}"/>
+              </a:ext>
+            </a:extLst>
+          </p:cNvPr>
+          <p:cNvSpPr txBox="1"/>
+          <p:nvPr/>
+        </p:nvSpPr>
+        <p:spPr>
+          <a:xfrm>
+            <a:off x="5215828" y="6281803"/>
+            <a:ext cx="1447191" cy="369332"/>
+          </a:xfrm>
+          <a:prstGeom prst="rect">
+            <a:avLst/>
+          </a:prstGeom>
+          <a:noFill/>
+        </p:spPr>
+        <p:txBody>
+          <a:bodyPr wrap="none" rtlCol="0">
+            <a:spAutoFit/>
+          </a:bodyPr>
+          <a:lstStyle/>
+          <a:p>
+            <a:r>
+              <a:rPr lang="en-US" dirty="0"/>
+              <a:t>ROC = 0.8774</a:t>
+            </a:r>
+          </a:p>
+        </p:txBody>
+      </p:sp>
+    </p:spTree>
+    <p:extLst>
+      <p:ext uri="{BB962C8B-B14F-4D97-AF65-F5344CB8AC3E}">
+        <p14:creationId xmlns:p14="http://schemas.microsoft.com/office/powerpoint/2010/main" val="306524005"/>
+      </p:ext>
+    </p:extLst>
+  </p:cSld>
+  <p:clrMapOvr>
+    <a:masterClrMapping/>
+  </p:clrMapOvr>
+</p:sld>
+</file>
+
+<file path=ppt/slides/slide11.xml><?xml version="1.0" encoding="utf-8"?>
+<p:sld xmlns:a="http://schemas.openxmlformats.org/drawingml/2006/main" xmlns:r="http://schemas.openxmlformats.org/officeDocument/2006/relationships" xmlns:p="http://schemas.openxmlformats.org/presentationml/2006/main">
+  <p:cSld>
+    <p:spTree>
+      <p:nvGrpSpPr>
+        <p:cNvPr id="1" name=""/>
+        <p:cNvGrpSpPr/>
+        <p:nvPr/>
+      </p:nvGrpSpPr>
+      <p:grpSpPr>
+        <a:xfrm>
+          <a:off x="0" y="0"/>
+          <a:ext cx="0" cy="0"/>
+          <a:chOff x="0" y="0"/>
+          <a:chExt cx="0" cy="0"/>
+        </a:xfrm>
+      </p:grpSpPr>
+      <p:pic>
+        <p:nvPicPr>
+          <p:cNvPr id="5" name="Picture 4">
+            <a:extLst>
+              <a:ext uri="{FF2B5EF4-FFF2-40B4-BE49-F238E27FC236}">
+                <a16:creationId xmlns:a16="http://schemas.microsoft.com/office/drawing/2014/main" id="{558453F9-F3C1-EDA3-6D83-43170A158A07}"/>
+              </a:ext>
+            </a:extLst>
+          </p:cNvPr>
+          <p:cNvPicPr>
+            <a:picLocks noChangeAspect="1"/>
+          </p:cNvPicPr>
+          <p:nvPr/>
+        </p:nvPicPr>
+        <p:blipFill rotWithShape="1">
+          <a:blip r:embed="rId3"/>
+          <a:srcRect t="10770" r="84371" b="20000"/>
+          <a:stretch/>
+        </p:blipFill>
+        <p:spPr>
+          <a:xfrm>
+            <a:off x="0" y="0"/>
+            <a:ext cx="1073997" cy="1175657"/>
+          </a:xfrm>
+          <a:prstGeom prst="rect">
+            <a:avLst/>
+          </a:prstGeom>
+        </p:spPr>
+      </p:pic>
+      <p:pic>
+        <p:nvPicPr>
+          <p:cNvPr id="6" name="Picture 5">
+            <a:extLst>
+              <a:ext uri="{FF2B5EF4-FFF2-40B4-BE49-F238E27FC236}">
+                <a16:creationId xmlns:a16="http://schemas.microsoft.com/office/drawing/2014/main" id="{CE1484BB-74DC-9E65-B32D-BE5FE2E385CD}"/>
+              </a:ext>
+            </a:extLst>
+          </p:cNvPr>
+          <p:cNvPicPr>
+            <a:picLocks noChangeAspect="1"/>
+          </p:cNvPicPr>
+          <p:nvPr/>
+        </p:nvPicPr>
+        <p:blipFill rotWithShape="1">
+          <a:blip r:embed="rId3"/>
+          <a:srcRect l="15172"/>
+          <a:stretch/>
+        </p:blipFill>
+        <p:spPr>
+          <a:xfrm>
+            <a:off x="9949987" y="0"/>
+            <a:ext cx="2242014" cy="653143"/>
+          </a:xfrm>
+          <a:prstGeom prst="rect">
+            <a:avLst/>
+          </a:prstGeom>
+        </p:spPr>
+      </p:pic>
+      <p:sp>
+        <p:nvSpPr>
+          <p:cNvPr id="7" name="TextBox 6">
+            <a:extLst>
+              <a:ext uri="{FF2B5EF4-FFF2-40B4-BE49-F238E27FC236}">
+                <a16:creationId xmlns:a16="http://schemas.microsoft.com/office/drawing/2014/main" id="{9EECCCD9-8AD5-9916-BC29-771066C9EE70}"/>
+              </a:ext>
+            </a:extLst>
+          </p:cNvPr>
+          <p:cNvSpPr txBox="1"/>
+          <p:nvPr/>
+        </p:nvSpPr>
+        <p:spPr>
+          <a:xfrm>
+            <a:off x="1" y="470259"/>
+            <a:ext cx="12192000" cy="861774"/>
+          </a:xfrm>
+          <a:prstGeom prst="rect">
+            <a:avLst/>
+          </a:prstGeom>
+          <a:noFill/>
+        </p:spPr>
+        <p:txBody>
+          <a:bodyPr wrap="square" rtlCol="0">
+            <a:spAutoFit/>
+          </a:bodyPr>
+          <a:lstStyle/>
+          <a:p>
+            <a:pPr algn="ctr"/>
+            <a:r>
+              <a:rPr lang="en-US" sz="5000" b="1" dirty="0">
+                <a:solidFill>
+                  <a:srgbClr val="002060"/>
+                </a:solidFill>
+              </a:rPr>
               <a:t>Classification Tree – Application</a:t>
             </a:r>
           </a:p>
@@ -6031,213 +6449,6 @@
 </p:sld>
 </file>
 
-<file path=ppt/slides/slide11.xml><?xml version="1.0" encoding="utf-8"?>
-<p:sld xmlns:a="http://schemas.openxmlformats.org/drawingml/2006/main" xmlns:r="http://schemas.openxmlformats.org/officeDocument/2006/relationships" xmlns:p="http://schemas.openxmlformats.org/presentationml/2006/main">
-  <p:cSld>
-    <p:spTree>
-      <p:nvGrpSpPr>
-        <p:cNvPr id="1" name=""/>
-        <p:cNvGrpSpPr/>
-        <p:nvPr/>
-      </p:nvGrpSpPr>
-      <p:grpSpPr>
-        <a:xfrm>
-          <a:off x="0" y="0"/>
-          <a:ext cx="0" cy="0"/>
-          <a:chOff x="0" y="0"/>
-          <a:chExt cx="0" cy="0"/>
-        </a:xfrm>
-      </p:grpSpPr>
-      <p:pic>
-        <p:nvPicPr>
-          <p:cNvPr id="5" name="Picture 4">
-            <a:extLst>
-              <a:ext uri="{FF2B5EF4-FFF2-40B4-BE49-F238E27FC236}">
-                <a16:creationId xmlns:a16="http://schemas.microsoft.com/office/drawing/2014/main" id="{558453F9-F3C1-EDA3-6D83-43170A158A07}"/>
-              </a:ext>
-            </a:extLst>
-          </p:cNvPr>
-          <p:cNvPicPr>
-            <a:picLocks noChangeAspect="1"/>
-          </p:cNvPicPr>
-          <p:nvPr/>
-        </p:nvPicPr>
-        <p:blipFill rotWithShape="1">
-          <a:blip r:embed="rId2"/>
-          <a:srcRect t="10770" r="84371" b="20000"/>
-          <a:stretch/>
-        </p:blipFill>
-        <p:spPr>
-          <a:xfrm>
-            <a:off x="0" y="0"/>
-            <a:ext cx="1073997" cy="1175657"/>
-          </a:xfrm>
-          <a:prstGeom prst="rect">
-            <a:avLst/>
-          </a:prstGeom>
-        </p:spPr>
-      </p:pic>
-      <p:pic>
-        <p:nvPicPr>
-          <p:cNvPr id="6" name="Picture 5">
-            <a:extLst>
-              <a:ext uri="{FF2B5EF4-FFF2-40B4-BE49-F238E27FC236}">
-                <a16:creationId xmlns:a16="http://schemas.microsoft.com/office/drawing/2014/main" id="{CE1484BB-74DC-9E65-B32D-BE5FE2E385CD}"/>
-              </a:ext>
-            </a:extLst>
-          </p:cNvPr>
-          <p:cNvPicPr>
-            <a:picLocks noChangeAspect="1"/>
-          </p:cNvPicPr>
-          <p:nvPr/>
-        </p:nvPicPr>
-        <p:blipFill rotWithShape="1">
-          <a:blip r:embed="rId2"/>
-          <a:srcRect l="15172"/>
-          <a:stretch/>
-        </p:blipFill>
-        <p:spPr>
-          <a:xfrm>
-            <a:off x="9949987" y="0"/>
-            <a:ext cx="2242014" cy="653143"/>
-          </a:xfrm>
-          <a:prstGeom prst="rect">
-            <a:avLst/>
-          </a:prstGeom>
-        </p:spPr>
-      </p:pic>
-      <p:sp>
-        <p:nvSpPr>
-          <p:cNvPr id="7" name="TextBox 6">
-            <a:extLst>
-              <a:ext uri="{FF2B5EF4-FFF2-40B4-BE49-F238E27FC236}">
-                <a16:creationId xmlns:a16="http://schemas.microsoft.com/office/drawing/2014/main" id="{9EECCCD9-8AD5-9916-BC29-771066C9EE70}"/>
-              </a:ext>
-            </a:extLst>
-          </p:cNvPr>
-          <p:cNvSpPr txBox="1"/>
-          <p:nvPr/>
-        </p:nvSpPr>
-        <p:spPr>
-          <a:xfrm>
-            <a:off x="1" y="470259"/>
-            <a:ext cx="12192000" cy="861774"/>
-          </a:xfrm>
-          <a:prstGeom prst="rect">
-            <a:avLst/>
-          </a:prstGeom>
-          <a:noFill/>
-        </p:spPr>
-        <p:txBody>
-          <a:bodyPr wrap="square" rtlCol="0">
-            <a:spAutoFit/>
-          </a:bodyPr>
-          <a:lstStyle/>
-          <a:p>
-            <a:pPr algn="ctr"/>
-            <a:r>
-              <a:rPr lang="en-US" sz="5000" b="1" dirty="0">
-                <a:solidFill>
-                  <a:srgbClr val="002060"/>
-                </a:solidFill>
-              </a:rPr>
-              <a:t>Simple Linear Regression – 1 of 4 (replace)</a:t>
-            </a:r>
-          </a:p>
-        </p:txBody>
-      </p:sp>
-      <p:cxnSp>
-        <p:nvCxnSpPr>
-          <p:cNvPr id="9" name="Straight Connector 8">
-            <a:extLst>
-              <a:ext uri="{FF2B5EF4-FFF2-40B4-BE49-F238E27FC236}">
-                <a16:creationId xmlns:a16="http://schemas.microsoft.com/office/drawing/2014/main" id="{450EE6D2-7381-B11A-A20A-0D5D0904DD35}"/>
-              </a:ext>
-            </a:extLst>
-          </p:cNvPr>
-          <p:cNvCxnSpPr>
-            <a:cxnSpLocks/>
-          </p:cNvCxnSpPr>
-          <p:nvPr/>
-        </p:nvCxnSpPr>
-        <p:spPr>
-          <a:xfrm>
-            <a:off x="757647" y="1332033"/>
-            <a:ext cx="10659291" cy="0"/>
-          </a:xfrm>
-          <a:prstGeom prst="line">
-            <a:avLst/>
-          </a:prstGeom>
-          <a:ln w="57150">
-            <a:solidFill>
-              <a:srgbClr val="002060"/>
-            </a:solidFill>
-          </a:ln>
-        </p:spPr>
-        <p:style>
-          <a:lnRef idx="1">
-            <a:schemeClr val="accent1"/>
-          </a:lnRef>
-          <a:fillRef idx="0">
-            <a:schemeClr val="accent1"/>
-          </a:fillRef>
-          <a:effectRef idx="0">
-            <a:schemeClr val="accent1"/>
-          </a:effectRef>
-          <a:fontRef idx="minor">
-            <a:schemeClr val="tx1"/>
-          </a:fontRef>
-        </p:style>
-      </p:cxnSp>
-      <p:pic>
-        <p:nvPicPr>
-          <p:cNvPr id="3" name="Picture 2" descr="Chart, scatter chart&#10;&#10;Description automatically generated">
-            <a:extLst>
-              <a:ext uri="{FF2B5EF4-FFF2-40B4-BE49-F238E27FC236}">
-                <a16:creationId xmlns:a16="http://schemas.microsoft.com/office/drawing/2014/main" id="{0A0D98A2-1CB5-BBD8-B706-27E15AC1D6CC}"/>
-              </a:ext>
-            </a:extLst>
-          </p:cNvPr>
-          <p:cNvPicPr>
-            <a:picLocks noChangeAspect="1"/>
-          </p:cNvPicPr>
-          <p:nvPr/>
-        </p:nvPicPr>
-        <p:blipFill>
-          <a:blip r:embed="rId3">
-            <a:extLst>
-              <a:ext uri="{28A0092B-C50C-407E-A947-70E740481C1C}">
-                <a14:useLocalDpi xmlns:a14="http://schemas.microsoft.com/office/drawing/2010/main" val="0"/>
-              </a:ext>
-            </a:extLst>
-          </a:blip>
-          <a:stretch>
-            <a:fillRect/>
-          </a:stretch>
-        </p:blipFill>
-        <p:spPr>
-          <a:xfrm>
-            <a:off x="2246811" y="1371600"/>
-            <a:ext cx="7680961" cy="5486400"/>
-          </a:xfrm>
-          <a:prstGeom prst="rect">
-            <a:avLst/>
-          </a:prstGeom>
-        </p:spPr>
-      </p:pic>
-    </p:spTree>
-    <p:extLst>
-      <p:ext uri="{BB962C8B-B14F-4D97-AF65-F5344CB8AC3E}">
-        <p14:creationId xmlns:p14="http://schemas.microsoft.com/office/powerpoint/2010/main" val="3440039680"/>
-      </p:ext>
-    </p:extLst>
-  </p:cSld>
-  <p:clrMapOvr>
-    <a:masterClrMapping/>
-  </p:clrMapOvr>
-</p:sld>
-</file>
-
 <file path=ppt/slides/slide12.xml><?xml version="1.0" encoding="utf-8"?>
 <p:sld xmlns:a="http://schemas.openxmlformats.org/drawingml/2006/main" xmlns:r="http://schemas.openxmlformats.org/officeDocument/2006/relationships" xmlns:p="http://schemas.openxmlformats.org/presentationml/2006/main">
   <p:cSld>
@@ -6328,7 +6539,7 @@
         <p:spPr>
           <a:xfrm>
             <a:off x="1" y="470259"/>
-            <a:ext cx="12192000" cy="1631216"/>
+            <a:ext cx="12192000" cy="861774"/>
           </a:xfrm>
           <a:prstGeom prst="rect">
             <a:avLst/>
@@ -6348,16 +6559,8 @@
                   <a:srgbClr val="002060"/>
                 </a:solidFill>
               </a:rPr>
-              <a:t>Simple Linear Regression – 2 of 4 (replace)</a:t>
-            </a:r>
-          </a:p>
-          <a:p>
-            <a:pPr algn="ctr"/>
-            <a:endParaRPr lang="en-US" sz="5000" b="1" dirty="0">
-              <a:solidFill>
-                <a:srgbClr val="002060"/>
-              </a:solidFill>
-            </a:endParaRPr>
+              <a:t>Simple Linear Regression – 1 of 4</a:t>
+            </a:r>
           </a:p>
         </p:txBody>
       </p:sp>
@@ -6406,10 +6609,10 @@
       </p:cxnSp>
       <p:pic>
         <p:nvPicPr>
-          <p:cNvPr id="3" name="Picture 2" descr="Chart, scatter chart&#10;&#10;Description automatically generated">
-            <a:extLst>
-              <a:ext uri="{FF2B5EF4-FFF2-40B4-BE49-F238E27FC236}">
-                <a16:creationId xmlns:a16="http://schemas.microsoft.com/office/drawing/2014/main" id="{2B610CC7-5A9F-1088-D327-F48002BFB30E}"/>
+          <p:cNvPr id="4" name="Picture 3" descr="Chart&#10;&#10;Description automatically generated">
+            <a:extLst>
+              <a:ext uri="{FF2B5EF4-FFF2-40B4-BE49-F238E27FC236}">
+                <a16:creationId xmlns:a16="http://schemas.microsoft.com/office/drawing/2014/main" id="{336BB0A6-4E7B-92E8-12B8-999E4E319221}"/>
               </a:ext>
             </a:extLst>
           </p:cNvPr>
@@ -6432,8 +6635,8 @@
         </p:blipFill>
         <p:spPr>
           <a:xfrm>
-            <a:off x="2255519" y="1371600"/>
-            <a:ext cx="7680961" cy="5486400"/>
+            <a:off x="2895576" y="1631498"/>
+            <a:ext cx="6400847" cy="4572033"/>
           </a:xfrm>
           <a:prstGeom prst="rect">
             <a:avLst/>
@@ -6443,7 +6646,7 @@
     </p:spTree>
     <p:extLst>
       <p:ext uri="{BB962C8B-B14F-4D97-AF65-F5344CB8AC3E}">
-        <p14:creationId xmlns:p14="http://schemas.microsoft.com/office/powerpoint/2010/main" val="2315470928"/>
+        <p14:creationId xmlns:p14="http://schemas.microsoft.com/office/powerpoint/2010/main" val="3440039680"/>
       </p:ext>
     </p:extLst>
   </p:cSld>
@@ -6563,7 +6766,7 @@
                   <a:srgbClr val="002060"/>
                 </a:solidFill>
               </a:rPr>
-              <a:t>Simple Linear Regression – 3 of 4 (replace)</a:t>
+              <a:t>Simple Linear Regression – 2 of 4</a:t>
             </a:r>
           </a:p>
           <a:p>
@@ -6621,10 +6824,10 @@
       </p:cxnSp>
       <p:pic>
         <p:nvPicPr>
-          <p:cNvPr id="8" name="Picture 7" descr="Chart, scatter chart&#10;&#10;Description automatically generated">
-            <a:extLst>
-              <a:ext uri="{FF2B5EF4-FFF2-40B4-BE49-F238E27FC236}">
-                <a16:creationId xmlns:a16="http://schemas.microsoft.com/office/drawing/2014/main" id="{E481E6C7-2F7B-6761-EC7E-00E453B1EB96}"/>
+          <p:cNvPr id="4" name="Picture 3" descr="Chart&#10;&#10;Description automatically generated">
+            <a:extLst>
+              <a:ext uri="{FF2B5EF4-FFF2-40B4-BE49-F238E27FC236}">
+                <a16:creationId xmlns:a16="http://schemas.microsoft.com/office/drawing/2014/main" id="{5A3932E9-DD2F-078D-9A68-45C09A76AC7A}"/>
               </a:ext>
             </a:extLst>
           </p:cNvPr>
@@ -6647,8 +6850,8 @@
         </p:blipFill>
         <p:spPr>
           <a:xfrm>
-            <a:off x="2246811" y="1371600"/>
-            <a:ext cx="7680961" cy="5486400"/>
+            <a:off x="2895576" y="1575131"/>
+            <a:ext cx="6400847" cy="4572033"/>
           </a:xfrm>
           <a:prstGeom prst="rect">
             <a:avLst/>
@@ -6658,7 +6861,7 @@
     </p:spTree>
     <p:extLst>
       <p:ext uri="{BB962C8B-B14F-4D97-AF65-F5344CB8AC3E}">
-        <p14:creationId xmlns:p14="http://schemas.microsoft.com/office/powerpoint/2010/main" val="3135211236"/>
+        <p14:creationId xmlns:p14="http://schemas.microsoft.com/office/powerpoint/2010/main" val="2315470928"/>
       </p:ext>
     </p:extLst>
   </p:cSld>
@@ -6778,12 +6981,12 @@
                   <a:srgbClr val="002060"/>
                 </a:solidFill>
               </a:rPr>
-              <a:t>Simple Linear Regression – 4 of 4 (replace)</a:t>
+              <a:t>Simple Linear Regression – 3 of 4</a:t>
             </a:r>
           </a:p>
           <a:p>
             <a:pPr algn="ctr"/>
-            <a:endParaRPr lang="en-US" sz="5000" dirty="0">
+            <a:endParaRPr lang="en-US" sz="5000" b="1" dirty="0">
               <a:solidFill>
                 <a:srgbClr val="002060"/>
               </a:solidFill>
@@ -6839,7 +7042,7 @@
           <p:cNvPr id="3" name="Picture 2" descr="Chart, scatter chart&#10;&#10;Description automatically generated">
             <a:extLst>
               <a:ext uri="{FF2B5EF4-FFF2-40B4-BE49-F238E27FC236}">
-                <a16:creationId xmlns:a16="http://schemas.microsoft.com/office/drawing/2014/main" id="{70188D01-A2E2-4A9E-D02B-C5CE8708E5E5}"/>
+                <a16:creationId xmlns:a16="http://schemas.microsoft.com/office/drawing/2014/main" id="{7317D386-6C38-EFF7-DF24-BD7C25BBE381}"/>
               </a:ext>
             </a:extLst>
           </p:cNvPr>
@@ -6862,8 +7065,8 @@
         </p:blipFill>
         <p:spPr>
           <a:xfrm>
-            <a:off x="2255519" y="1371600"/>
-            <a:ext cx="7680961" cy="5486400"/>
+            <a:off x="2886868" y="1815708"/>
+            <a:ext cx="6400847" cy="4572033"/>
           </a:xfrm>
           <a:prstGeom prst="rect">
             <a:avLst/>
@@ -6873,7 +7076,7 @@
     </p:spTree>
     <p:extLst>
       <p:ext uri="{BB962C8B-B14F-4D97-AF65-F5344CB8AC3E}">
-        <p14:creationId xmlns:p14="http://schemas.microsoft.com/office/powerpoint/2010/main" val="1087057766"/>
+        <p14:creationId xmlns:p14="http://schemas.microsoft.com/office/powerpoint/2010/main" val="3135211236"/>
       </p:ext>
     </p:extLst>
   </p:cSld>
@@ -6993,7 +7196,7 @@
                   <a:srgbClr val="002060"/>
                 </a:solidFill>
               </a:rPr>
-              <a:t>Logistic Regression</a:t>
+              <a:t>Simple Linear Regression – 4 of 4</a:t>
             </a:r>
           </a:p>
           <a:p>
@@ -7049,10 +7252,46 @@
           </a:fontRef>
         </p:style>
       </p:cxnSp>
+      <p:pic>
+        <p:nvPicPr>
+          <p:cNvPr id="4" name="Picture 3" descr="Chart&#10;&#10;Description automatically generated">
+            <a:extLst>
+              <a:ext uri="{FF2B5EF4-FFF2-40B4-BE49-F238E27FC236}">
+                <a16:creationId xmlns:a16="http://schemas.microsoft.com/office/drawing/2014/main" id="{E53D5306-5BA2-B775-84A4-9AC0440B1EA7}"/>
+              </a:ext>
+            </a:extLst>
+          </p:cNvPr>
+          <p:cNvPicPr>
+            <a:picLocks noChangeAspect="1"/>
+          </p:cNvPicPr>
+          <p:nvPr/>
+        </p:nvPicPr>
+        <p:blipFill>
+          <a:blip r:embed="rId3">
+            <a:extLst>
+              <a:ext uri="{28A0092B-C50C-407E-A947-70E740481C1C}">
+                <a14:useLocalDpi xmlns:a14="http://schemas.microsoft.com/office/drawing/2010/main" val="0"/>
+              </a:ext>
+            </a:extLst>
+          </a:blip>
+          <a:stretch>
+            <a:fillRect/>
+          </a:stretch>
+        </p:blipFill>
+        <p:spPr>
+          <a:xfrm>
+            <a:off x="2886868" y="1815708"/>
+            <a:ext cx="6400847" cy="4572033"/>
+          </a:xfrm>
+          <a:prstGeom prst="rect">
+            <a:avLst/>
+          </a:prstGeom>
+        </p:spPr>
+      </p:pic>
     </p:spTree>
     <p:extLst>
       <p:ext uri="{BB962C8B-B14F-4D97-AF65-F5344CB8AC3E}">
-        <p14:creationId xmlns:p14="http://schemas.microsoft.com/office/powerpoint/2010/main" val="4029267829"/>
+        <p14:creationId xmlns:p14="http://schemas.microsoft.com/office/powerpoint/2010/main" val="1087057766"/>
       </p:ext>
     </p:extLst>
   </p:cSld>
@@ -7172,7 +7411,7 @@
                   <a:srgbClr val="002060"/>
                 </a:solidFill>
               </a:rPr>
-              <a:t>Multiple Linear Regression</a:t>
+              <a:t>Logistic Regression – Credit Policy</a:t>
             </a:r>
           </a:p>
           <a:p>
@@ -7228,10 +7467,46 @@
           </a:fontRef>
         </p:style>
       </p:cxnSp>
+      <p:pic>
+        <p:nvPicPr>
+          <p:cNvPr id="3" name="Picture 2" descr="Chart&#10;&#10;Description automatically generated">
+            <a:extLst>
+              <a:ext uri="{FF2B5EF4-FFF2-40B4-BE49-F238E27FC236}">
+                <a16:creationId xmlns:a16="http://schemas.microsoft.com/office/drawing/2014/main" id="{8B33217A-198E-C50A-6DDE-8BD6434B97BC}"/>
+              </a:ext>
+            </a:extLst>
+          </p:cNvPr>
+          <p:cNvPicPr>
+            <a:picLocks noChangeAspect="1"/>
+          </p:cNvPicPr>
+          <p:nvPr/>
+        </p:nvPicPr>
+        <p:blipFill>
+          <a:blip r:embed="rId3">
+            <a:extLst>
+              <a:ext uri="{28A0092B-C50C-407E-A947-70E740481C1C}">
+                <a14:useLocalDpi xmlns:a14="http://schemas.microsoft.com/office/drawing/2010/main" val="0"/>
+              </a:ext>
+            </a:extLst>
+          </a:blip>
+          <a:stretch>
+            <a:fillRect/>
+          </a:stretch>
+        </p:blipFill>
+        <p:spPr>
+          <a:xfrm>
+            <a:off x="2886868" y="1687866"/>
+            <a:ext cx="6400847" cy="4572033"/>
+          </a:xfrm>
+          <a:prstGeom prst="rect">
+            <a:avLst/>
+          </a:prstGeom>
+        </p:spPr>
+      </p:pic>
     </p:spTree>
     <p:extLst>
       <p:ext uri="{BB962C8B-B14F-4D97-AF65-F5344CB8AC3E}">
-        <p14:creationId xmlns:p14="http://schemas.microsoft.com/office/powerpoint/2010/main" val="1460743001"/>
+        <p14:creationId xmlns:p14="http://schemas.microsoft.com/office/powerpoint/2010/main" val="4029267829"/>
       </p:ext>
     </p:extLst>
   </p:cSld>
@@ -7351,7 +7626,7 @@
                   <a:srgbClr val="002060"/>
                 </a:solidFill>
               </a:rPr>
-              <a:t>Lasso Regression</a:t>
+              <a:t>Logistic Regression – Credit Policy</a:t>
             </a:r>
           </a:p>
           <a:p>
@@ -7407,10 +7682,40 @@
           </a:fontRef>
         </p:style>
       </p:cxnSp>
+      <p:pic>
+        <p:nvPicPr>
+          <p:cNvPr id="4" name="Picture 3">
+            <a:extLst>
+              <a:ext uri="{FF2B5EF4-FFF2-40B4-BE49-F238E27FC236}">
+                <a16:creationId xmlns:a16="http://schemas.microsoft.com/office/drawing/2014/main" id="{A19AD511-4FD6-9E60-078C-B38E84FA4D7F}"/>
+              </a:ext>
+            </a:extLst>
+          </p:cNvPr>
+          <p:cNvPicPr>
+            <a:picLocks noChangeAspect="1"/>
+          </p:cNvPicPr>
+          <p:nvPr/>
+        </p:nvPicPr>
+        <p:blipFill>
+          <a:blip r:embed="rId3"/>
+          <a:stretch>
+            <a:fillRect/>
+          </a:stretch>
+        </p:blipFill>
+        <p:spPr>
+          <a:xfrm>
+            <a:off x="3880351" y="0"/>
+            <a:ext cx="4046424" cy="6858000"/>
+          </a:xfrm>
+          <a:prstGeom prst="rect">
+            <a:avLst/>
+          </a:prstGeom>
+        </p:spPr>
+      </p:pic>
     </p:spTree>
     <p:extLst>
       <p:ext uri="{BB962C8B-B14F-4D97-AF65-F5344CB8AC3E}">
-        <p14:creationId xmlns:p14="http://schemas.microsoft.com/office/powerpoint/2010/main" val="1893722804"/>
+        <p14:creationId xmlns:p14="http://schemas.microsoft.com/office/powerpoint/2010/main" val="697410562"/>
       </p:ext>
     </p:extLst>
   </p:cSld>
@@ -7423,14 +7728,6 @@
 <file path=ppt/slides/slide18.xml><?xml version="1.0" encoding="utf-8"?>
 <p:sld xmlns:a="http://schemas.openxmlformats.org/drawingml/2006/main" xmlns:r="http://schemas.openxmlformats.org/officeDocument/2006/relationships" xmlns:p="http://schemas.openxmlformats.org/presentationml/2006/main">
   <p:cSld>
-    <p:bg>
-      <p:bgPr>
-        <a:solidFill>
-          <a:srgbClr val="103B5E"/>
-        </a:solidFill>
-        <a:effectLst/>
-      </p:bgPr>
-    </p:bg>
     <p:spTree>
       <p:nvGrpSpPr>
         <p:cNvPr id="1" name=""/>
@@ -7445,12 +7742,70 @@
           <a:chExt cx="0" cy="0"/>
         </a:xfrm>
       </p:grpSpPr>
+      <p:pic>
+        <p:nvPicPr>
+          <p:cNvPr id="5" name="Picture 4">
+            <a:extLst>
+              <a:ext uri="{FF2B5EF4-FFF2-40B4-BE49-F238E27FC236}">
+                <a16:creationId xmlns:a16="http://schemas.microsoft.com/office/drawing/2014/main" id="{558453F9-F3C1-EDA3-6D83-43170A158A07}"/>
+              </a:ext>
+            </a:extLst>
+          </p:cNvPr>
+          <p:cNvPicPr>
+            <a:picLocks noChangeAspect="1"/>
+          </p:cNvPicPr>
+          <p:nvPr/>
+        </p:nvPicPr>
+        <p:blipFill rotWithShape="1">
+          <a:blip r:embed="rId2"/>
+          <a:srcRect t="10770" r="84371" b="20000"/>
+          <a:stretch/>
+        </p:blipFill>
+        <p:spPr>
+          <a:xfrm>
+            <a:off x="0" y="0"/>
+            <a:ext cx="1073997" cy="1175657"/>
+          </a:xfrm>
+          <a:prstGeom prst="rect">
+            <a:avLst/>
+          </a:prstGeom>
+        </p:spPr>
+      </p:pic>
+      <p:pic>
+        <p:nvPicPr>
+          <p:cNvPr id="6" name="Picture 5">
+            <a:extLst>
+              <a:ext uri="{FF2B5EF4-FFF2-40B4-BE49-F238E27FC236}">
+                <a16:creationId xmlns:a16="http://schemas.microsoft.com/office/drawing/2014/main" id="{CE1484BB-74DC-9E65-B32D-BE5FE2E385CD}"/>
+              </a:ext>
+            </a:extLst>
+          </p:cNvPr>
+          <p:cNvPicPr>
+            <a:picLocks noChangeAspect="1"/>
+          </p:cNvPicPr>
+          <p:nvPr/>
+        </p:nvPicPr>
+        <p:blipFill rotWithShape="1">
+          <a:blip r:embed="rId2"/>
+          <a:srcRect l="15172"/>
+          <a:stretch/>
+        </p:blipFill>
+        <p:spPr>
+          <a:xfrm>
+            <a:off x="9949987" y="0"/>
+            <a:ext cx="2242014" cy="653143"/>
+          </a:xfrm>
+          <a:prstGeom prst="rect">
+            <a:avLst/>
+          </a:prstGeom>
+        </p:spPr>
+      </p:pic>
       <p:sp>
         <p:nvSpPr>
-          <p:cNvPr id="32" name="TextBox 31">
-            <a:extLst>
-              <a:ext uri="{FF2B5EF4-FFF2-40B4-BE49-F238E27FC236}">
-                <a16:creationId xmlns:a16="http://schemas.microsoft.com/office/drawing/2014/main" id="{0426EA6E-8DCD-68BB-CC42-016432ED85F5}"/>
+          <p:cNvPr id="7" name="TextBox 6">
+            <a:extLst>
+              <a:ext uri="{FF2B5EF4-FFF2-40B4-BE49-F238E27FC236}">
+                <a16:creationId xmlns:a16="http://schemas.microsoft.com/office/drawing/2014/main" id="{9EECCCD9-8AD5-9916-BC29-771066C9EE70}"/>
               </a:ext>
             </a:extLst>
           </p:cNvPr>
@@ -7459,8 +7814,8 @@
         </p:nvSpPr>
         <p:spPr>
           <a:xfrm>
-            <a:off x="0" y="2367155"/>
-            <a:ext cx="12192001" cy="1015663"/>
+            <a:off x="1" y="470259"/>
+            <a:ext cx="12192000" cy="1631216"/>
           </a:xfrm>
           <a:prstGeom prst="rect">
             <a:avLst/>
@@ -7475,20 +7830,316 @@
           <a:p>
             <a:pPr algn="ctr"/>
             <a:r>
-              <a:rPr lang="en-US" sz="6000" dirty="0">
+              <a:rPr lang="en-US" sz="5000" b="1" dirty="0">
                 <a:solidFill>
-                  <a:schemeClr val="bg1"/>
+                  <a:srgbClr val="002060"/>
                 </a:solidFill>
               </a:rPr>
-              <a:t>Questions?</a:t>
-            </a:r>
+              <a:t>Logistic Regression – Credit Policy</a:t>
+            </a:r>
+          </a:p>
+          <a:p>
+            <a:pPr algn="ctr"/>
+            <a:endParaRPr lang="en-US" sz="5000" dirty="0">
+              <a:solidFill>
+                <a:srgbClr val="002060"/>
+              </a:solidFill>
+            </a:endParaRPr>
           </a:p>
         </p:txBody>
       </p:sp>
+      <p:cxnSp>
+        <p:nvCxnSpPr>
+          <p:cNvPr id="9" name="Straight Connector 8">
+            <a:extLst>
+              <a:ext uri="{FF2B5EF4-FFF2-40B4-BE49-F238E27FC236}">
+                <a16:creationId xmlns:a16="http://schemas.microsoft.com/office/drawing/2014/main" id="{450EE6D2-7381-B11A-A20A-0D5D0904DD35}"/>
+              </a:ext>
+            </a:extLst>
+          </p:cNvPr>
+          <p:cNvCxnSpPr>
+            <a:cxnSpLocks/>
+          </p:cNvCxnSpPr>
+          <p:nvPr/>
+        </p:nvCxnSpPr>
+        <p:spPr>
+          <a:xfrm>
+            <a:off x="757647" y="1332033"/>
+            <a:ext cx="10659291" cy="0"/>
+          </a:xfrm>
+          <a:prstGeom prst="line">
+            <a:avLst/>
+          </a:prstGeom>
+          <a:ln w="57150">
+            <a:solidFill>
+              <a:srgbClr val="002060"/>
+            </a:solidFill>
+          </a:ln>
+        </p:spPr>
+        <p:style>
+          <a:lnRef idx="1">
+            <a:schemeClr val="accent1"/>
+          </a:lnRef>
+          <a:fillRef idx="0">
+            <a:schemeClr val="accent1"/>
+          </a:fillRef>
+          <a:effectRef idx="0">
+            <a:schemeClr val="accent1"/>
+          </a:effectRef>
+          <a:fontRef idx="minor">
+            <a:schemeClr val="tx1"/>
+          </a:fontRef>
+        </p:style>
+      </p:cxnSp>
+      <p:pic>
+        <p:nvPicPr>
+          <p:cNvPr id="3" name="Picture 2">
+            <a:extLst>
+              <a:ext uri="{FF2B5EF4-FFF2-40B4-BE49-F238E27FC236}">
+                <a16:creationId xmlns:a16="http://schemas.microsoft.com/office/drawing/2014/main" id="{DFA50187-4266-8085-0DA9-50A85EB54D17}"/>
+              </a:ext>
+            </a:extLst>
+          </p:cNvPr>
+          <p:cNvPicPr>
+            <a:picLocks noChangeAspect="1"/>
+          </p:cNvPicPr>
+          <p:nvPr/>
+        </p:nvPicPr>
+        <p:blipFill>
+          <a:blip r:embed="rId3"/>
+          <a:stretch>
+            <a:fillRect/>
+          </a:stretch>
+        </p:blipFill>
+        <p:spPr>
+          <a:xfrm>
+            <a:off x="4082946" y="2870464"/>
+            <a:ext cx="4026107" cy="1530429"/>
+          </a:xfrm>
+          <a:prstGeom prst="rect">
+            <a:avLst/>
+          </a:prstGeom>
+        </p:spPr>
+      </p:pic>
     </p:spTree>
     <p:extLst>
       <p:ext uri="{BB962C8B-B14F-4D97-AF65-F5344CB8AC3E}">
-        <p14:creationId xmlns:p14="http://schemas.microsoft.com/office/powerpoint/2010/main" val="1924305025"/>
+        <p14:creationId xmlns:p14="http://schemas.microsoft.com/office/powerpoint/2010/main" val="3046938398"/>
+      </p:ext>
+    </p:extLst>
+  </p:cSld>
+  <p:clrMapOvr>
+    <a:masterClrMapping/>
+  </p:clrMapOvr>
+</p:sld>
+</file>
+
+<file path=ppt/slides/slide19.xml><?xml version="1.0" encoding="utf-8"?>
+<p:sld xmlns:a="http://schemas.openxmlformats.org/drawingml/2006/main" xmlns:r="http://schemas.openxmlformats.org/officeDocument/2006/relationships" xmlns:p="http://schemas.openxmlformats.org/presentationml/2006/main">
+  <p:cSld>
+    <p:spTree>
+      <p:nvGrpSpPr>
+        <p:cNvPr id="1" name=""/>
+        <p:cNvGrpSpPr/>
+        <p:nvPr/>
+      </p:nvGrpSpPr>
+      <p:grpSpPr>
+        <a:xfrm>
+          <a:off x="0" y="0"/>
+          <a:ext cx="0" cy="0"/>
+          <a:chOff x="0" y="0"/>
+          <a:chExt cx="0" cy="0"/>
+        </a:xfrm>
+      </p:grpSpPr>
+      <p:pic>
+        <p:nvPicPr>
+          <p:cNvPr id="5" name="Picture 4">
+            <a:extLst>
+              <a:ext uri="{FF2B5EF4-FFF2-40B4-BE49-F238E27FC236}">
+                <a16:creationId xmlns:a16="http://schemas.microsoft.com/office/drawing/2014/main" id="{558453F9-F3C1-EDA3-6D83-43170A158A07}"/>
+              </a:ext>
+            </a:extLst>
+          </p:cNvPr>
+          <p:cNvPicPr>
+            <a:picLocks noChangeAspect="1"/>
+          </p:cNvPicPr>
+          <p:nvPr/>
+        </p:nvPicPr>
+        <p:blipFill rotWithShape="1">
+          <a:blip r:embed="rId2"/>
+          <a:srcRect t="10770" r="84371" b="20000"/>
+          <a:stretch/>
+        </p:blipFill>
+        <p:spPr>
+          <a:xfrm>
+            <a:off x="0" y="0"/>
+            <a:ext cx="1073997" cy="1175657"/>
+          </a:xfrm>
+          <a:prstGeom prst="rect">
+            <a:avLst/>
+          </a:prstGeom>
+        </p:spPr>
+      </p:pic>
+      <p:pic>
+        <p:nvPicPr>
+          <p:cNvPr id="6" name="Picture 5">
+            <a:extLst>
+              <a:ext uri="{FF2B5EF4-FFF2-40B4-BE49-F238E27FC236}">
+                <a16:creationId xmlns:a16="http://schemas.microsoft.com/office/drawing/2014/main" id="{CE1484BB-74DC-9E65-B32D-BE5FE2E385CD}"/>
+              </a:ext>
+            </a:extLst>
+          </p:cNvPr>
+          <p:cNvPicPr>
+            <a:picLocks noChangeAspect="1"/>
+          </p:cNvPicPr>
+          <p:nvPr/>
+        </p:nvPicPr>
+        <p:blipFill rotWithShape="1">
+          <a:blip r:embed="rId2"/>
+          <a:srcRect l="15172"/>
+          <a:stretch/>
+        </p:blipFill>
+        <p:spPr>
+          <a:xfrm>
+            <a:off x="9949987" y="0"/>
+            <a:ext cx="2242014" cy="653143"/>
+          </a:xfrm>
+          <a:prstGeom prst="rect">
+            <a:avLst/>
+          </a:prstGeom>
+        </p:spPr>
+      </p:pic>
+      <p:sp>
+        <p:nvSpPr>
+          <p:cNvPr id="7" name="TextBox 6">
+            <a:extLst>
+              <a:ext uri="{FF2B5EF4-FFF2-40B4-BE49-F238E27FC236}">
+                <a16:creationId xmlns:a16="http://schemas.microsoft.com/office/drawing/2014/main" id="{9EECCCD9-8AD5-9916-BC29-771066C9EE70}"/>
+              </a:ext>
+            </a:extLst>
+          </p:cNvPr>
+          <p:cNvSpPr txBox="1"/>
+          <p:nvPr/>
+        </p:nvSpPr>
+        <p:spPr>
+          <a:xfrm>
+            <a:off x="1" y="470259"/>
+            <a:ext cx="12192000" cy="1631216"/>
+          </a:xfrm>
+          <a:prstGeom prst="rect">
+            <a:avLst/>
+          </a:prstGeom>
+          <a:noFill/>
+        </p:spPr>
+        <p:txBody>
+          <a:bodyPr wrap="square" rtlCol="0">
+            <a:spAutoFit/>
+          </a:bodyPr>
+          <a:lstStyle/>
+          <a:p>
+            <a:pPr algn="ctr"/>
+            <a:r>
+              <a:rPr lang="en-US" sz="5000" b="1" dirty="0">
+                <a:solidFill>
+                  <a:srgbClr val="002060"/>
+                </a:solidFill>
+              </a:rPr>
+              <a:t>Logistic Regression – Credit Policy</a:t>
+            </a:r>
+          </a:p>
+          <a:p>
+            <a:pPr algn="ctr"/>
+            <a:endParaRPr lang="en-US" sz="5000" dirty="0">
+              <a:solidFill>
+                <a:srgbClr val="002060"/>
+              </a:solidFill>
+            </a:endParaRPr>
+          </a:p>
+        </p:txBody>
+      </p:sp>
+      <p:cxnSp>
+        <p:nvCxnSpPr>
+          <p:cNvPr id="9" name="Straight Connector 8">
+            <a:extLst>
+              <a:ext uri="{FF2B5EF4-FFF2-40B4-BE49-F238E27FC236}">
+                <a16:creationId xmlns:a16="http://schemas.microsoft.com/office/drawing/2014/main" id="{450EE6D2-7381-B11A-A20A-0D5D0904DD35}"/>
+              </a:ext>
+            </a:extLst>
+          </p:cNvPr>
+          <p:cNvCxnSpPr>
+            <a:cxnSpLocks/>
+          </p:cNvCxnSpPr>
+          <p:nvPr/>
+        </p:nvCxnSpPr>
+        <p:spPr>
+          <a:xfrm>
+            <a:off x="757647" y="1332033"/>
+            <a:ext cx="10659291" cy="0"/>
+          </a:xfrm>
+          <a:prstGeom prst="line">
+            <a:avLst/>
+          </a:prstGeom>
+          <a:ln w="57150">
+            <a:solidFill>
+              <a:srgbClr val="002060"/>
+            </a:solidFill>
+          </a:ln>
+        </p:spPr>
+        <p:style>
+          <a:lnRef idx="1">
+            <a:schemeClr val="accent1"/>
+          </a:lnRef>
+          <a:fillRef idx="0">
+            <a:schemeClr val="accent1"/>
+          </a:fillRef>
+          <a:effectRef idx="0">
+            <a:schemeClr val="accent1"/>
+          </a:effectRef>
+          <a:fontRef idx="minor">
+            <a:schemeClr val="tx1"/>
+          </a:fontRef>
+        </p:style>
+      </p:cxnSp>
+      <p:pic>
+        <p:nvPicPr>
+          <p:cNvPr id="4" name="Picture 3" descr="A picture containing chart&#10;&#10;Description automatically generated">
+            <a:extLst>
+              <a:ext uri="{FF2B5EF4-FFF2-40B4-BE49-F238E27FC236}">
+                <a16:creationId xmlns:a16="http://schemas.microsoft.com/office/drawing/2014/main" id="{EF9E986C-AE26-C3CC-4D6A-0FB74A5C0283}"/>
+              </a:ext>
+            </a:extLst>
+          </p:cNvPr>
+          <p:cNvPicPr>
+            <a:picLocks noChangeAspect="1"/>
+          </p:cNvPicPr>
+          <p:nvPr/>
+        </p:nvPicPr>
+        <p:blipFill>
+          <a:blip r:embed="rId3">
+            <a:extLst>
+              <a:ext uri="{28A0092B-C50C-407E-A947-70E740481C1C}">
+                <a14:useLocalDpi xmlns:a14="http://schemas.microsoft.com/office/drawing/2010/main" val="0"/>
+              </a:ext>
+            </a:extLst>
+          </a:blip>
+          <a:stretch>
+            <a:fillRect/>
+          </a:stretch>
+        </p:blipFill>
+        <p:spPr>
+          <a:xfrm>
+            <a:off x="2886868" y="1731706"/>
+            <a:ext cx="6400847" cy="4572033"/>
+          </a:xfrm>
+          <a:prstGeom prst="rect">
+            <a:avLst/>
+          </a:prstGeom>
+        </p:spPr>
+      </p:pic>
+    </p:spTree>
+    <p:extLst>
+      <p:ext uri="{BB962C8B-B14F-4D97-AF65-F5344CB8AC3E}">
+        <p14:creationId xmlns:p14="http://schemas.microsoft.com/office/powerpoint/2010/main" val="4040338310"/>
       </p:ext>
     </p:extLst>
   </p:cSld>
@@ -7744,6 +8395,1290 @@
     <p:extLst>
       <p:ext uri="{BB962C8B-B14F-4D97-AF65-F5344CB8AC3E}">
         <p14:creationId xmlns:p14="http://schemas.microsoft.com/office/powerpoint/2010/main" val="654429940"/>
+      </p:ext>
+    </p:extLst>
+  </p:cSld>
+  <p:clrMapOvr>
+    <a:masterClrMapping/>
+  </p:clrMapOvr>
+</p:sld>
+</file>
+
+<file path=ppt/slides/slide20.xml><?xml version="1.0" encoding="utf-8"?>
+<p:sld xmlns:a="http://schemas.openxmlformats.org/drawingml/2006/main" xmlns:r="http://schemas.openxmlformats.org/officeDocument/2006/relationships" xmlns:p="http://schemas.openxmlformats.org/presentationml/2006/main">
+  <p:cSld>
+    <p:spTree>
+      <p:nvGrpSpPr>
+        <p:cNvPr id="1" name=""/>
+        <p:cNvGrpSpPr/>
+        <p:nvPr/>
+      </p:nvGrpSpPr>
+      <p:grpSpPr>
+        <a:xfrm>
+          <a:off x="0" y="0"/>
+          <a:ext cx="0" cy="0"/>
+          <a:chOff x="0" y="0"/>
+          <a:chExt cx="0" cy="0"/>
+        </a:xfrm>
+      </p:grpSpPr>
+      <p:pic>
+        <p:nvPicPr>
+          <p:cNvPr id="5" name="Picture 4">
+            <a:extLst>
+              <a:ext uri="{FF2B5EF4-FFF2-40B4-BE49-F238E27FC236}">
+                <a16:creationId xmlns:a16="http://schemas.microsoft.com/office/drawing/2014/main" id="{558453F9-F3C1-EDA3-6D83-43170A158A07}"/>
+              </a:ext>
+            </a:extLst>
+          </p:cNvPr>
+          <p:cNvPicPr>
+            <a:picLocks noChangeAspect="1"/>
+          </p:cNvPicPr>
+          <p:nvPr/>
+        </p:nvPicPr>
+        <p:blipFill rotWithShape="1">
+          <a:blip r:embed="rId2"/>
+          <a:srcRect t="10770" r="84371" b="20000"/>
+          <a:stretch/>
+        </p:blipFill>
+        <p:spPr>
+          <a:xfrm>
+            <a:off x="0" y="0"/>
+            <a:ext cx="1073997" cy="1175657"/>
+          </a:xfrm>
+          <a:prstGeom prst="rect">
+            <a:avLst/>
+          </a:prstGeom>
+        </p:spPr>
+      </p:pic>
+      <p:pic>
+        <p:nvPicPr>
+          <p:cNvPr id="6" name="Picture 5">
+            <a:extLst>
+              <a:ext uri="{FF2B5EF4-FFF2-40B4-BE49-F238E27FC236}">
+                <a16:creationId xmlns:a16="http://schemas.microsoft.com/office/drawing/2014/main" id="{CE1484BB-74DC-9E65-B32D-BE5FE2E385CD}"/>
+              </a:ext>
+            </a:extLst>
+          </p:cNvPr>
+          <p:cNvPicPr>
+            <a:picLocks noChangeAspect="1"/>
+          </p:cNvPicPr>
+          <p:nvPr/>
+        </p:nvPicPr>
+        <p:blipFill rotWithShape="1">
+          <a:blip r:embed="rId2"/>
+          <a:srcRect l="15172"/>
+          <a:stretch/>
+        </p:blipFill>
+        <p:spPr>
+          <a:xfrm>
+            <a:off x="9949987" y="0"/>
+            <a:ext cx="2242014" cy="653143"/>
+          </a:xfrm>
+          <a:prstGeom prst="rect">
+            <a:avLst/>
+          </a:prstGeom>
+        </p:spPr>
+      </p:pic>
+      <p:sp>
+        <p:nvSpPr>
+          <p:cNvPr id="7" name="TextBox 6">
+            <a:extLst>
+              <a:ext uri="{FF2B5EF4-FFF2-40B4-BE49-F238E27FC236}">
+                <a16:creationId xmlns:a16="http://schemas.microsoft.com/office/drawing/2014/main" id="{9EECCCD9-8AD5-9916-BC29-771066C9EE70}"/>
+              </a:ext>
+            </a:extLst>
+          </p:cNvPr>
+          <p:cNvSpPr txBox="1"/>
+          <p:nvPr/>
+        </p:nvSpPr>
+        <p:spPr>
+          <a:xfrm>
+            <a:off x="1" y="470259"/>
+            <a:ext cx="12192000" cy="1631216"/>
+          </a:xfrm>
+          <a:prstGeom prst="rect">
+            <a:avLst/>
+          </a:prstGeom>
+          <a:noFill/>
+        </p:spPr>
+        <p:txBody>
+          <a:bodyPr wrap="square" rtlCol="0">
+            <a:spAutoFit/>
+          </a:bodyPr>
+          <a:lstStyle/>
+          <a:p>
+            <a:pPr algn="ctr"/>
+            <a:r>
+              <a:rPr lang="en-US" sz="5000" b="1" dirty="0">
+                <a:solidFill>
+                  <a:srgbClr val="002060"/>
+                </a:solidFill>
+              </a:rPr>
+              <a:t>Logistic Regression – Not Fully Paid</a:t>
+            </a:r>
+          </a:p>
+          <a:p>
+            <a:pPr algn="ctr"/>
+            <a:endParaRPr lang="en-US" sz="5000" dirty="0">
+              <a:solidFill>
+                <a:srgbClr val="002060"/>
+              </a:solidFill>
+            </a:endParaRPr>
+          </a:p>
+        </p:txBody>
+      </p:sp>
+      <p:cxnSp>
+        <p:nvCxnSpPr>
+          <p:cNvPr id="9" name="Straight Connector 8">
+            <a:extLst>
+              <a:ext uri="{FF2B5EF4-FFF2-40B4-BE49-F238E27FC236}">
+                <a16:creationId xmlns:a16="http://schemas.microsoft.com/office/drawing/2014/main" id="{450EE6D2-7381-B11A-A20A-0D5D0904DD35}"/>
+              </a:ext>
+            </a:extLst>
+          </p:cNvPr>
+          <p:cNvCxnSpPr>
+            <a:cxnSpLocks/>
+          </p:cNvCxnSpPr>
+          <p:nvPr/>
+        </p:nvCxnSpPr>
+        <p:spPr>
+          <a:xfrm>
+            <a:off x="757647" y="1332033"/>
+            <a:ext cx="10659291" cy="0"/>
+          </a:xfrm>
+          <a:prstGeom prst="line">
+            <a:avLst/>
+          </a:prstGeom>
+          <a:ln w="57150">
+            <a:solidFill>
+              <a:srgbClr val="002060"/>
+            </a:solidFill>
+          </a:ln>
+        </p:spPr>
+        <p:style>
+          <a:lnRef idx="1">
+            <a:schemeClr val="accent1"/>
+          </a:lnRef>
+          <a:fillRef idx="0">
+            <a:schemeClr val="accent1"/>
+          </a:fillRef>
+          <a:effectRef idx="0">
+            <a:schemeClr val="accent1"/>
+          </a:effectRef>
+          <a:fontRef idx="minor">
+            <a:schemeClr val="tx1"/>
+          </a:fontRef>
+        </p:style>
+      </p:cxnSp>
+      <p:pic>
+        <p:nvPicPr>
+          <p:cNvPr id="4" name="Picture 3" descr="Chart&#10;&#10;Description automatically generated">
+            <a:extLst>
+              <a:ext uri="{FF2B5EF4-FFF2-40B4-BE49-F238E27FC236}">
+                <a16:creationId xmlns:a16="http://schemas.microsoft.com/office/drawing/2014/main" id="{3DD92608-18D5-CA21-C822-95D4C9B7F6A7}"/>
+              </a:ext>
+            </a:extLst>
+          </p:cNvPr>
+          <p:cNvPicPr>
+            <a:picLocks noChangeAspect="1"/>
+          </p:cNvPicPr>
+          <p:nvPr/>
+        </p:nvPicPr>
+        <p:blipFill>
+          <a:blip r:embed="rId3">
+            <a:extLst>
+              <a:ext uri="{28A0092B-C50C-407E-A947-70E740481C1C}">
+                <a14:useLocalDpi xmlns:a14="http://schemas.microsoft.com/office/drawing/2010/main" val="0"/>
+              </a:ext>
+            </a:extLst>
+          </a:blip>
+          <a:stretch>
+            <a:fillRect/>
+          </a:stretch>
+        </p:blipFill>
+        <p:spPr>
+          <a:xfrm>
+            <a:off x="2886868" y="1675339"/>
+            <a:ext cx="6400847" cy="4572033"/>
+          </a:xfrm>
+          <a:prstGeom prst="rect">
+            <a:avLst/>
+          </a:prstGeom>
+        </p:spPr>
+      </p:pic>
+    </p:spTree>
+    <p:extLst>
+      <p:ext uri="{BB962C8B-B14F-4D97-AF65-F5344CB8AC3E}">
+        <p14:creationId xmlns:p14="http://schemas.microsoft.com/office/powerpoint/2010/main" val="2792606219"/>
+      </p:ext>
+    </p:extLst>
+  </p:cSld>
+  <p:clrMapOvr>
+    <a:masterClrMapping/>
+  </p:clrMapOvr>
+</p:sld>
+</file>
+
+<file path=ppt/slides/slide21.xml><?xml version="1.0" encoding="utf-8"?>
+<p:sld xmlns:a="http://schemas.openxmlformats.org/drawingml/2006/main" xmlns:r="http://schemas.openxmlformats.org/officeDocument/2006/relationships" xmlns:p="http://schemas.openxmlformats.org/presentationml/2006/main">
+  <p:cSld>
+    <p:spTree>
+      <p:nvGrpSpPr>
+        <p:cNvPr id="1" name=""/>
+        <p:cNvGrpSpPr/>
+        <p:nvPr/>
+      </p:nvGrpSpPr>
+      <p:grpSpPr>
+        <a:xfrm>
+          <a:off x="0" y="0"/>
+          <a:ext cx="0" cy="0"/>
+          <a:chOff x="0" y="0"/>
+          <a:chExt cx="0" cy="0"/>
+        </a:xfrm>
+      </p:grpSpPr>
+      <p:pic>
+        <p:nvPicPr>
+          <p:cNvPr id="5" name="Picture 4">
+            <a:extLst>
+              <a:ext uri="{FF2B5EF4-FFF2-40B4-BE49-F238E27FC236}">
+                <a16:creationId xmlns:a16="http://schemas.microsoft.com/office/drawing/2014/main" id="{558453F9-F3C1-EDA3-6D83-43170A158A07}"/>
+              </a:ext>
+            </a:extLst>
+          </p:cNvPr>
+          <p:cNvPicPr>
+            <a:picLocks noChangeAspect="1"/>
+          </p:cNvPicPr>
+          <p:nvPr/>
+        </p:nvPicPr>
+        <p:blipFill rotWithShape="1">
+          <a:blip r:embed="rId2"/>
+          <a:srcRect t="10770" r="84371" b="20000"/>
+          <a:stretch/>
+        </p:blipFill>
+        <p:spPr>
+          <a:xfrm>
+            <a:off x="0" y="0"/>
+            <a:ext cx="1073997" cy="1175657"/>
+          </a:xfrm>
+          <a:prstGeom prst="rect">
+            <a:avLst/>
+          </a:prstGeom>
+        </p:spPr>
+      </p:pic>
+      <p:pic>
+        <p:nvPicPr>
+          <p:cNvPr id="6" name="Picture 5">
+            <a:extLst>
+              <a:ext uri="{FF2B5EF4-FFF2-40B4-BE49-F238E27FC236}">
+                <a16:creationId xmlns:a16="http://schemas.microsoft.com/office/drawing/2014/main" id="{CE1484BB-74DC-9E65-B32D-BE5FE2E385CD}"/>
+              </a:ext>
+            </a:extLst>
+          </p:cNvPr>
+          <p:cNvPicPr>
+            <a:picLocks noChangeAspect="1"/>
+          </p:cNvPicPr>
+          <p:nvPr/>
+        </p:nvPicPr>
+        <p:blipFill rotWithShape="1">
+          <a:blip r:embed="rId2"/>
+          <a:srcRect l="15172"/>
+          <a:stretch/>
+        </p:blipFill>
+        <p:spPr>
+          <a:xfrm>
+            <a:off x="9949987" y="0"/>
+            <a:ext cx="2242014" cy="653143"/>
+          </a:xfrm>
+          <a:prstGeom prst="rect">
+            <a:avLst/>
+          </a:prstGeom>
+        </p:spPr>
+      </p:pic>
+      <p:sp>
+        <p:nvSpPr>
+          <p:cNvPr id="7" name="TextBox 6">
+            <a:extLst>
+              <a:ext uri="{FF2B5EF4-FFF2-40B4-BE49-F238E27FC236}">
+                <a16:creationId xmlns:a16="http://schemas.microsoft.com/office/drawing/2014/main" id="{9EECCCD9-8AD5-9916-BC29-771066C9EE70}"/>
+              </a:ext>
+            </a:extLst>
+          </p:cNvPr>
+          <p:cNvSpPr txBox="1"/>
+          <p:nvPr/>
+        </p:nvSpPr>
+        <p:spPr>
+          <a:xfrm>
+            <a:off x="1" y="470259"/>
+            <a:ext cx="12192000" cy="1631216"/>
+          </a:xfrm>
+          <a:prstGeom prst="rect">
+            <a:avLst/>
+          </a:prstGeom>
+          <a:noFill/>
+        </p:spPr>
+        <p:txBody>
+          <a:bodyPr wrap="square" rtlCol="0">
+            <a:spAutoFit/>
+          </a:bodyPr>
+          <a:lstStyle/>
+          <a:p>
+            <a:pPr algn="ctr"/>
+            <a:r>
+              <a:rPr lang="en-US" sz="5000" b="1" dirty="0">
+                <a:solidFill>
+                  <a:srgbClr val="002060"/>
+                </a:solidFill>
+              </a:rPr>
+              <a:t>Logistic Regression – Credit Policy</a:t>
+            </a:r>
+          </a:p>
+          <a:p>
+            <a:pPr algn="ctr"/>
+            <a:endParaRPr lang="en-US" sz="5000" dirty="0">
+              <a:solidFill>
+                <a:srgbClr val="002060"/>
+              </a:solidFill>
+            </a:endParaRPr>
+          </a:p>
+        </p:txBody>
+      </p:sp>
+      <p:cxnSp>
+        <p:nvCxnSpPr>
+          <p:cNvPr id="9" name="Straight Connector 8">
+            <a:extLst>
+              <a:ext uri="{FF2B5EF4-FFF2-40B4-BE49-F238E27FC236}">
+                <a16:creationId xmlns:a16="http://schemas.microsoft.com/office/drawing/2014/main" id="{450EE6D2-7381-B11A-A20A-0D5D0904DD35}"/>
+              </a:ext>
+            </a:extLst>
+          </p:cNvPr>
+          <p:cNvCxnSpPr>
+            <a:cxnSpLocks/>
+          </p:cNvCxnSpPr>
+          <p:nvPr/>
+        </p:nvCxnSpPr>
+        <p:spPr>
+          <a:xfrm>
+            <a:off x="757647" y="1332033"/>
+            <a:ext cx="10659291" cy="0"/>
+          </a:xfrm>
+          <a:prstGeom prst="line">
+            <a:avLst/>
+          </a:prstGeom>
+          <a:ln w="57150">
+            <a:solidFill>
+              <a:srgbClr val="002060"/>
+            </a:solidFill>
+          </a:ln>
+        </p:spPr>
+        <p:style>
+          <a:lnRef idx="1">
+            <a:schemeClr val="accent1"/>
+          </a:lnRef>
+          <a:fillRef idx="0">
+            <a:schemeClr val="accent1"/>
+          </a:fillRef>
+          <a:effectRef idx="0">
+            <a:schemeClr val="accent1"/>
+          </a:effectRef>
+          <a:fontRef idx="minor">
+            <a:schemeClr val="tx1"/>
+          </a:fontRef>
+        </p:style>
+      </p:cxnSp>
+      <p:pic>
+        <p:nvPicPr>
+          <p:cNvPr id="3" name="Picture 2">
+            <a:extLst>
+              <a:ext uri="{FF2B5EF4-FFF2-40B4-BE49-F238E27FC236}">
+                <a16:creationId xmlns:a16="http://schemas.microsoft.com/office/drawing/2014/main" id="{5E04EC06-9E56-D09A-5B08-5A1E2A1021D8}"/>
+              </a:ext>
+            </a:extLst>
+          </p:cNvPr>
+          <p:cNvPicPr>
+            <a:picLocks noChangeAspect="1"/>
+          </p:cNvPicPr>
+          <p:nvPr/>
+        </p:nvPicPr>
+        <p:blipFill>
+          <a:blip r:embed="rId3"/>
+          <a:stretch>
+            <a:fillRect/>
+          </a:stretch>
+        </p:blipFill>
+        <p:spPr>
+          <a:xfrm>
+            <a:off x="4176747" y="0"/>
+            <a:ext cx="3838506" cy="6858000"/>
+          </a:xfrm>
+          <a:prstGeom prst="rect">
+            <a:avLst/>
+          </a:prstGeom>
+        </p:spPr>
+      </p:pic>
+    </p:spTree>
+    <p:extLst>
+      <p:ext uri="{BB962C8B-B14F-4D97-AF65-F5344CB8AC3E}">
+        <p14:creationId xmlns:p14="http://schemas.microsoft.com/office/powerpoint/2010/main" val="2538059948"/>
+      </p:ext>
+    </p:extLst>
+  </p:cSld>
+  <p:clrMapOvr>
+    <a:masterClrMapping/>
+  </p:clrMapOvr>
+</p:sld>
+</file>
+
+<file path=ppt/slides/slide22.xml><?xml version="1.0" encoding="utf-8"?>
+<p:sld xmlns:a="http://schemas.openxmlformats.org/drawingml/2006/main" xmlns:r="http://schemas.openxmlformats.org/officeDocument/2006/relationships" xmlns:p="http://schemas.openxmlformats.org/presentationml/2006/main">
+  <p:cSld>
+    <p:spTree>
+      <p:nvGrpSpPr>
+        <p:cNvPr id="1" name=""/>
+        <p:cNvGrpSpPr/>
+        <p:nvPr/>
+      </p:nvGrpSpPr>
+      <p:grpSpPr>
+        <a:xfrm>
+          <a:off x="0" y="0"/>
+          <a:ext cx="0" cy="0"/>
+          <a:chOff x="0" y="0"/>
+          <a:chExt cx="0" cy="0"/>
+        </a:xfrm>
+      </p:grpSpPr>
+      <p:pic>
+        <p:nvPicPr>
+          <p:cNvPr id="5" name="Picture 4">
+            <a:extLst>
+              <a:ext uri="{FF2B5EF4-FFF2-40B4-BE49-F238E27FC236}">
+                <a16:creationId xmlns:a16="http://schemas.microsoft.com/office/drawing/2014/main" id="{558453F9-F3C1-EDA3-6D83-43170A158A07}"/>
+              </a:ext>
+            </a:extLst>
+          </p:cNvPr>
+          <p:cNvPicPr>
+            <a:picLocks noChangeAspect="1"/>
+          </p:cNvPicPr>
+          <p:nvPr/>
+        </p:nvPicPr>
+        <p:blipFill rotWithShape="1">
+          <a:blip r:embed="rId2"/>
+          <a:srcRect t="10770" r="84371" b="20000"/>
+          <a:stretch/>
+        </p:blipFill>
+        <p:spPr>
+          <a:xfrm>
+            <a:off x="0" y="0"/>
+            <a:ext cx="1073997" cy="1175657"/>
+          </a:xfrm>
+          <a:prstGeom prst="rect">
+            <a:avLst/>
+          </a:prstGeom>
+        </p:spPr>
+      </p:pic>
+      <p:pic>
+        <p:nvPicPr>
+          <p:cNvPr id="6" name="Picture 5">
+            <a:extLst>
+              <a:ext uri="{FF2B5EF4-FFF2-40B4-BE49-F238E27FC236}">
+                <a16:creationId xmlns:a16="http://schemas.microsoft.com/office/drawing/2014/main" id="{CE1484BB-74DC-9E65-B32D-BE5FE2E385CD}"/>
+              </a:ext>
+            </a:extLst>
+          </p:cNvPr>
+          <p:cNvPicPr>
+            <a:picLocks noChangeAspect="1"/>
+          </p:cNvPicPr>
+          <p:nvPr/>
+        </p:nvPicPr>
+        <p:blipFill rotWithShape="1">
+          <a:blip r:embed="rId2"/>
+          <a:srcRect l="15172"/>
+          <a:stretch/>
+        </p:blipFill>
+        <p:spPr>
+          <a:xfrm>
+            <a:off x="9949987" y="0"/>
+            <a:ext cx="2242014" cy="653143"/>
+          </a:xfrm>
+          <a:prstGeom prst="rect">
+            <a:avLst/>
+          </a:prstGeom>
+        </p:spPr>
+      </p:pic>
+      <p:sp>
+        <p:nvSpPr>
+          <p:cNvPr id="7" name="TextBox 6">
+            <a:extLst>
+              <a:ext uri="{FF2B5EF4-FFF2-40B4-BE49-F238E27FC236}">
+                <a16:creationId xmlns:a16="http://schemas.microsoft.com/office/drawing/2014/main" id="{9EECCCD9-8AD5-9916-BC29-771066C9EE70}"/>
+              </a:ext>
+            </a:extLst>
+          </p:cNvPr>
+          <p:cNvSpPr txBox="1"/>
+          <p:nvPr/>
+        </p:nvSpPr>
+        <p:spPr>
+          <a:xfrm>
+            <a:off x="1" y="470259"/>
+            <a:ext cx="12192000" cy="1631216"/>
+          </a:xfrm>
+          <a:prstGeom prst="rect">
+            <a:avLst/>
+          </a:prstGeom>
+          <a:noFill/>
+        </p:spPr>
+        <p:txBody>
+          <a:bodyPr wrap="square" rtlCol="0">
+            <a:spAutoFit/>
+          </a:bodyPr>
+          <a:lstStyle/>
+          <a:p>
+            <a:pPr algn="ctr"/>
+            <a:r>
+              <a:rPr lang="en-US" sz="5000" b="1" dirty="0">
+                <a:solidFill>
+                  <a:srgbClr val="002060"/>
+                </a:solidFill>
+              </a:rPr>
+              <a:t>Logistic Regression – Credit Policy</a:t>
+            </a:r>
+          </a:p>
+          <a:p>
+            <a:pPr algn="ctr"/>
+            <a:endParaRPr lang="en-US" sz="5000" dirty="0">
+              <a:solidFill>
+                <a:srgbClr val="002060"/>
+              </a:solidFill>
+            </a:endParaRPr>
+          </a:p>
+        </p:txBody>
+      </p:sp>
+      <p:cxnSp>
+        <p:nvCxnSpPr>
+          <p:cNvPr id="9" name="Straight Connector 8">
+            <a:extLst>
+              <a:ext uri="{FF2B5EF4-FFF2-40B4-BE49-F238E27FC236}">
+                <a16:creationId xmlns:a16="http://schemas.microsoft.com/office/drawing/2014/main" id="{450EE6D2-7381-B11A-A20A-0D5D0904DD35}"/>
+              </a:ext>
+            </a:extLst>
+          </p:cNvPr>
+          <p:cNvCxnSpPr>
+            <a:cxnSpLocks/>
+          </p:cNvCxnSpPr>
+          <p:nvPr/>
+        </p:nvCxnSpPr>
+        <p:spPr>
+          <a:xfrm>
+            <a:off x="757647" y="1332033"/>
+            <a:ext cx="10659291" cy="0"/>
+          </a:xfrm>
+          <a:prstGeom prst="line">
+            <a:avLst/>
+          </a:prstGeom>
+          <a:ln w="57150">
+            <a:solidFill>
+              <a:srgbClr val="002060"/>
+            </a:solidFill>
+          </a:ln>
+        </p:spPr>
+        <p:style>
+          <a:lnRef idx="1">
+            <a:schemeClr val="accent1"/>
+          </a:lnRef>
+          <a:fillRef idx="0">
+            <a:schemeClr val="accent1"/>
+          </a:fillRef>
+          <a:effectRef idx="0">
+            <a:schemeClr val="accent1"/>
+          </a:effectRef>
+          <a:fontRef idx="minor">
+            <a:schemeClr val="tx1"/>
+          </a:fontRef>
+        </p:style>
+      </p:cxnSp>
+      <p:pic>
+        <p:nvPicPr>
+          <p:cNvPr id="4" name="Picture 3">
+            <a:extLst>
+              <a:ext uri="{FF2B5EF4-FFF2-40B4-BE49-F238E27FC236}">
+                <a16:creationId xmlns:a16="http://schemas.microsoft.com/office/drawing/2014/main" id="{9C3A0CD7-3E13-B5E8-39AC-7218AE83F9A2}"/>
+              </a:ext>
+            </a:extLst>
+          </p:cNvPr>
+          <p:cNvPicPr>
+            <a:picLocks noChangeAspect="1"/>
+          </p:cNvPicPr>
+          <p:nvPr/>
+        </p:nvPicPr>
+        <p:blipFill>
+          <a:blip r:embed="rId3"/>
+          <a:stretch>
+            <a:fillRect/>
+          </a:stretch>
+        </p:blipFill>
+        <p:spPr>
+          <a:xfrm>
+            <a:off x="4083764" y="2571734"/>
+            <a:ext cx="4007056" cy="1663786"/>
+          </a:xfrm>
+          <a:prstGeom prst="rect">
+            <a:avLst/>
+          </a:prstGeom>
+        </p:spPr>
+      </p:pic>
+    </p:spTree>
+    <p:extLst>
+      <p:ext uri="{BB962C8B-B14F-4D97-AF65-F5344CB8AC3E}">
+        <p14:creationId xmlns:p14="http://schemas.microsoft.com/office/powerpoint/2010/main" val="538577802"/>
+      </p:ext>
+    </p:extLst>
+  </p:cSld>
+  <p:clrMapOvr>
+    <a:masterClrMapping/>
+  </p:clrMapOvr>
+</p:sld>
+</file>
+
+<file path=ppt/slides/slide23.xml><?xml version="1.0" encoding="utf-8"?>
+<p:sld xmlns:a="http://schemas.openxmlformats.org/drawingml/2006/main" xmlns:r="http://schemas.openxmlformats.org/officeDocument/2006/relationships" xmlns:p="http://schemas.openxmlformats.org/presentationml/2006/main">
+  <p:cSld>
+    <p:spTree>
+      <p:nvGrpSpPr>
+        <p:cNvPr id="1" name=""/>
+        <p:cNvGrpSpPr/>
+        <p:nvPr/>
+      </p:nvGrpSpPr>
+      <p:grpSpPr>
+        <a:xfrm>
+          <a:off x="0" y="0"/>
+          <a:ext cx="0" cy="0"/>
+          <a:chOff x="0" y="0"/>
+          <a:chExt cx="0" cy="0"/>
+        </a:xfrm>
+      </p:grpSpPr>
+      <p:pic>
+        <p:nvPicPr>
+          <p:cNvPr id="5" name="Picture 4">
+            <a:extLst>
+              <a:ext uri="{FF2B5EF4-FFF2-40B4-BE49-F238E27FC236}">
+                <a16:creationId xmlns:a16="http://schemas.microsoft.com/office/drawing/2014/main" id="{558453F9-F3C1-EDA3-6D83-43170A158A07}"/>
+              </a:ext>
+            </a:extLst>
+          </p:cNvPr>
+          <p:cNvPicPr>
+            <a:picLocks noChangeAspect="1"/>
+          </p:cNvPicPr>
+          <p:nvPr/>
+        </p:nvPicPr>
+        <p:blipFill rotWithShape="1">
+          <a:blip r:embed="rId2"/>
+          <a:srcRect t="10770" r="84371" b="20000"/>
+          <a:stretch/>
+        </p:blipFill>
+        <p:spPr>
+          <a:xfrm>
+            <a:off x="0" y="0"/>
+            <a:ext cx="1073997" cy="1175657"/>
+          </a:xfrm>
+          <a:prstGeom prst="rect">
+            <a:avLst/>
+          </a:prstGeom>
+        </p:spPr>
+      </p:pic>
+      <p:pic>
+        <p:nvPicPr>
+          <p:cNvPr id="6" name="Picture 5">
+            <a:extLst>
+              <a:ext uri="{FF2B5EF4-FFF2-40B4-BE49-F238E27FC236}">
+                <a16:creationId xmlns:a16="http://schemas.microsoft.com/office/drawing/2014/main" id="{CE1484BB-74DC-9E65-B32D-BE5FE2E385CD}"/>
+              </a:ext>
+            </a:extLst>
+          </p:cNvPr>
+          <p:cNvPicPr>
+            <a:picLocks noChangeAspect="1"/>
+          </p:cNvPicPr>
+          <p:nvPr/>
+        </p:nvPicPr>
+        <p:blipFill rotWithShape="1">
+          <a:blip r:embed="rId2"/>
+          <a:srcRect l="15172"/>
+          <a:stretch/>
+        </p:blipFill>
+        <p:spPr>
+          <a:xfrm>
+            <a:off x="9949987" y="0"/>
+            <a:ext cx="2242014" cy="653143"/>
+          </a:xfrm>
+          <a:prstGeom prst="rect">
+            <a:avLst/>
+          </a:prstGeom>
+        </p:spPr>
+      </p:pic>
+      <p:sp>
+        <p:nvSpPr>
+          <p:cNvPr id="7" name="TextBox 6">
+            <a:extLst>
+              <a:ext uri="{FF2B5EF4-FFF2-40B4-BE49-F238E27FC236}">
+                <a16:creationId xmlns:a16="http://schemas.microsoft.com/office/drawing/2014/main" id="{9EECCCD9-8AD5-9916-BC29-771066C9EE70}"/>
+              </a:ext>
+            </a:extLst>
+          </p:cNvPr>
+          <p:cNvSpPr txBox="1"/>
+          <p:nvPr/>
+        </p:nvSpPr>
+        <p:spPr>
+          <a:xfrm>
+            <a:off x="1" y="470259"/>
+            <a:ext cx="12192000" cy="1631216"/>
+          </a:xfrm>
+          <a:prstGeom prst="rect">
+            <a:avLst/>
+          </a:prstGeom>
+          <a:noFill/>
+        </p:spPr>
+        <p:txBody>
+          <a:bodyPr wrap="square" rtlCol="0">
+            <a:spAutoFit/>
+          </a:bodyPr>
+          <a:lstStyle/>
+          <a:p>
+            <a:pPr algn="ctr"/>
+            <a:r>
+              <a:rPr lang="en-US" sz="5000" b="1" dirty="0">
+                <a:solidFill>
+                  <a:srgbClr val="002060"/>
+                </a:solidFill>
+              </a:rPr>
+              <a:t>Logistic Regression – Credit Policy</a:t>
+            </a:r>
+          </a:p>
+          <a:p>
+            <a:pPr algn="ctr"/>
+            <a:endParaRPr lang="en-US" sz="5000" dirty="0">
+              <a:solidFill>
+                <a:srgbClr val="002060"/>
+              </a:solidFill>
+            </a:endParaRPr>
+          </a:p>
+        </p:txBody>
+      </p:sp>
+      <p:cxnSp>
+        <p:nvCxnSpPr>
+          <p:cNvPr id="9" name="Straight Connector 8">
+            <a:extLst>
+              <a:ext uri="{FF2B5EF4-FFF2-40B4-BE49-F238E27FC236}">
+                <a16:creationId xmlns:a16="http://schemas.microsoft.com/office/drawing/2014/main" id="{450EE6D2-7381-B11A-A20A-0D5D0904DD35}"/>
+              </a:ext>
+            </a:extLst>
+          </p:cNvPr>
+          <p:cNvCxnSpPr>
+            <a:cxnSpLocks/>
+          </p:cNvCxnSpPr>
+          <p:nvPr/>
+        </p:nvCxnSpPr>
+        <p:spPr>
+          <a:xfrm>
+            <a:off x="757647" y="1332033"/>
+            <a:ext cx="10659291" cy="0"/>
+          </a:xfrm>
+          <a:prstGeom prst="line">
+            <a:avLst/>
+          </a:prstGeom>
+          <a:ln w="57150">
+            <a:solidFill>
+              <a:srgbClr val="002060"/>
+            </a:solidFill>
+          </a:ln>
+        </p:spPr>
+        <p:style>
+          <a:lnRef idx="1">
+            <a:schemeClr val="accent1"/>
+          </a:lnRef>
+          <a:fillRef idx="0">
+            <a:schemeClr val="accent1"/>
+          </a:fillRef>
+          <a:effectRef idx="0">
+            <a:schemeClr val="accent1"/>
+          </a:effectRef>
+          <a:fontRef idx="minor">
+            <a:schemeClr val="tx1"/>
+          </a:fontRef>
+        </p:style>
+      </p:cxnSp>
+      <p:pic>
+        <p:nvPicPr>
+          <p:cNvPr id="3" name="Picture 2" descr="Chart&#10;&#10;Description automatically generated">
+            <a:extLst>
+              <a:ext uri="{FF2B5EF4-FFF2-40B4-BE49-F238E27FC236}">
+                <a16:creationId xmlns:a16="http://schemas.microsoft.com/office/drawing/2014/main" id="{F8CE4281-B37D-08C2-3C7F-6F74C9EBFC21}"/>
+              </a:ext>
+            </a:extLst>
+          </p:cNvPr>
+          <p:cNvPicPr>
+            <a:picLocks noChangeAspect="1"/>
+          </p:cNvPicPr>
+          <p:nvPr/>
+        </p:nvPicPr>
+        <p:blipFill>
+          <a:blip r:embed="rId3">
+            <a:extLst>
+              <a:ext uri="{28A0092B-C50C-407E-A947-70E740481C1C}">
+                <a14:useLocalDpi xmlns:a14="http://schemas.microsoft.com/office/drawing/2010/main" val="0"/>
+              </a:ext>
+            </a:extLst>
+          </a:blip>
+          <a:stretch>
+            <a:fillRect/>
+          </a:stretch>
+        </p:blipFill>
+        <p:spPr>
+          <a:xfrm>
+            <a:off x="2895576" y="1488410"/>
+            <a:ext cx="6400847" cy="4572033"/>
+          </a:xfrm>
+          <a:prstGeom prst="rect">
+            <a:avLst/>
+          </a:prstGeom>
+        </p:spPr>
+      </p:pic>
+    </p:spTree>
+    <p:extLst>
+      <p:ext uri="{BB962C8B-B14F-4D97-AF65-F5344CB8AC3E}">
+        <p14:creationId xmlns:p14="http://schemas.microsoft.com/office/powerpoint/2010/main" val="961642784"/>
+      </p:ext>
+    </p:extLst>
+  </p:cSld>
+  <p:clrMapOvr>
+    <a:masterClrMapping/>
+  </p:clrMapOvr>
+</p:sld>
+</file>
+
+<file path=ppt/slides/slide24.xml><?xml version="1.0" encoding="utf-8"?>
+<p:sld xmlns:a="http://schemas.openxmlformats.org/drawingml/2006/main" xmlns:r="http://schemas.openxmlformats.org/officeDocument/2006/relationships" xmlns:p="http://schemas.openxmlformats.org/presentationml/2006/main">
+  <p:cSld>
+    <p:spTree>
+      <p:nvGrpSpPr>
+        <p:cNvPr id="1" name=""/>
+        <p:cNvGrpSpPr/>
+        <p:nvPr/>
+      </p:nvGrpSpPr>
+      <p:grpSpPr>
+        <a:xfrm>
+          <a:off x="0" y="0"/>
+          <a:ext cx="0" cy="0"/>
+          <a:chOff x="0" y="0"/>
+          <a:chExt cx="0" cy="0"/>
+        </a:xfrm>
+      </p:grpSpPr>
+      <p:pic>
+        <p:nvPicPr>
+          <p:cNvPr id="5" name="Picture 4">
+            <a:extLst>
+              <a:ext uri="{FF2B5EF4-FFF2-40B4-BE49-F238E27FC236}">
+                <a16:creationId xmlns:a16="http://schemas.microsoft.com/office/drawing/2014/main" id="{558453F9-F3C1-EDA3-6D83-43170A158A07}"/>
+              </a:ext>
+            </a:extLst>
+          </p:cNvPr>
+          <p:cNvPicPr>
+            <a:picLocks noChangeAspect="1"/>
+          </p:cNvPicPr>
+          <p:nvPr/>
+        </p:nvPicPr>
+        <p:blipFill rotWithShape="1">
+          <a:blip r:embed="rId2"/>
+          <a:srcRect t="10770" r="84371" b="20000"/>
+          <a:stretch/>
+        </p:blipFill>
+        <p:spPr>
+          <a:xfrm>
+            <a:off x="0" y="0"/>
+            <a:ext cx="1073997" cy="1175657"/>
+          </a:xfrm>
+          <a:prstGeom prst="rect">
+            <a:avLst/>
+          </a:prstGeom>
+        </p:spPr>
+      </p:pic>
+      <p:pic>
+        <p:nvPicPr>
+          <p:cNvPr id="6" name="Picture 5">
+            <a:extLst>
+              <a:ext uri="{FF2B5EF4-FFF2-40B4-BE49-F238E27FC236}">
+                <a16:creationId xmlns:a16="http://schemas.microsoft.com/office/drawing/2014/main" id="{CE1484BB-74DC-9E65-B32D-BE5FE2E385CD}"/>
+              </a:ext>
+            </a:extLst>
+          </p:cNvPr>
+          <p:cNvPicPr>
+            <a:picLocks noChangeAspect="1"/>
+          </p:cNvPicPr>
+          <p:nvPr/>
+        </p:nvPicPr>
+        <p:blipFill rotWithShape="1">
+          <a:blip r:embed="rId2"/>
+          <a:srcRect l="15172"/>
+          <a:stretch/>
+        </p:blipFill>
+        <p:spPr>
+          <a:xfrm>
+            <a:off x="9949987" y="0"/>
+            <a:ext cx="2242014" cy="653143"/>
+          </a:xfrm>
+          <a:prstGeom prst="rect">
+            <a:avLst/>
+          </a:prstGeom>
+        </p:spPr>
+      </p:pic>
+      <p:sp>
+        <p:nvSpPr>
+          <p:cNvPr id="7" name="TextBox 6">
+            <a:extLst>
+              <a:ext uri="{FF2B5EF4-FFF2-40B4-BE49-F238E27FC236}">
+                <a16:creationId xmlns:a16="http://schemas.microsoft.com/office/drawing/2014/main" id="{9EECCCD9-8AD5-9916-BC29-771066C9EE70}"/>
+              </a:ext>
+            </a:extLst>
+          </p:cNvPr>
+          <p:cNvSpPr txBox="1"/>
+          <p:nvPr/>
+        </p:nvSpPr>
+        <p:spPr>
+          <a:xfrm>
+            <a:off x="1" y="470259"/>
+            <a:ext cx="12192000" cy="1631216"/>
+          </a:xfrm>
+          <a:prstGeom prst="rect">
+            <a:avLst/>
+          </a:prstGeom>
+          <a:noFill/>
+        </p:spPr>
+        <p:txBody>
+          <a:bodyPr wrap="square" rtlCol="0">
+            <a:spAutoFit/>
+          </a:bodyPr>
+          <a:lstStyle/>
+          <a:p>
+            <a:pPr algn="ctr"/>
+            <a:r>
+              <a:rPr lang="en-US" sz="5000" b="1" dirty="0">
+                <a:solidFill>
+                  <a:srgbClr val="002060"/>
+                </a:solidFill>
+              </a:rPr>
+              <a:t>Multiple Linear Regression</a:t>
+            </a:r>
+          </a:p>
+          <a:p>
+            <a:pPr algn="ctr"/>
+            <a:endParaRPr lang="en-US" sz="5000" dirty="0">
+              <a:solidFill>
+                <a:srgbClr val="002060"/>
+              </a:solidFill>
+            </a:endParaRPr>
+          </a:p>
+        </p:txBody>
+      </p:sp>
+      <p:cxnSp>
+        <p:nvCxnSpPr>
+          <p:cNvPr id="9" name="Straight Connector 8">
+            <a:extLst>
+              <a:ext uri="{FF2B5EF4-FFF2-40B4-BE49-F238E27FC236}">
+                <a16:creationId xmlns:a16="http://schemas.microsoft.com/office/drawing/2014/main" id="{450EE6D2-7381-B11A-A20A-0D5D0904DD35}"/>
+              </a:ext>
+            </a:extLst>
+          </p:cNvPr>
+          <p:cNvCxnSpPr>
+            <a:cxnSpLocks/>
+          </p:cNvCxnSpPr>
+          <p:nvPr/>
+        </p:nvCxnSpPr>
+        <p:spPr>
+          <a:xfrm>
+            <a:off x="757647" y="1332033"/>
+            <a:ext cx="10659291" cy="0"/>
+          </a:xfrm>
+          <a:prstGeom prst="line">
+            <a:avLst/>
+          </a:prstGeom>
+          <a:ln w="57150">
+            <a:solidFill>
+              <a:srgbClr val="002060"/>
+            </a:solidFill>
+          </a:ln>
+        </p:spPr>
+        <p:style>
+          <a:lnRef idx="1">
+            <a:schemeClr val="accent1"/>
+          </a:lnRef>
+          <a:fillRef idx="0">
+            <a:schemeClr val="accent1"/>
+          </a:fillRef>
+          <a:effectRef idx="0">
+            <a:schemeClr val="accent1"/>
+          </a:effectRef>
+          <a:fontRef idx="minor">
+            <a:schemeClr val="tx1"/>
+          </a:fontRef>
+        </p:style>
+      </p:cxnSp>
+    </p:spTree>
+    <p:extLst>
+      <p:ext uri="{BB962C8B-B14F-4D97-AF65-F5344CB8AC3E}">
+        <p14:creationId xmlns:p14="http://schemas.microsoft.com/office/powerpoint/2010/main" val="1460743001"/>
+      </p:ext>
+    </p:extLst>
+  </p:cSld>
+  <p:clrMapOvr>
+    <a:masterClrMapping/>
+  </p:clrMapOvr>
+</p:sld>
+</file>
+
+<file path=ppt/slides/slide25.xml><?xml version="1.0" encoding="utf-8"?>
+<p:sld xmlns:a="http://schemas.openxmlformats.org/drawingml/2006/main" xmlns:r="http://schemas.openxmlformats.org/officeDocument/2006/relationships" xmlns:p="http://schemas.openxmlformats.org/presentationml/2006/main">
+  <p:cSld>
+    <p:spTree>
+      <p:nvGrpSpPr>
+        <p:cNvPr id="1" name=""/>
+        <p:cNvGrpSpPr/>
+        <p:nvPr/>
+      </p:nvGrpSpPr>
+      <p:grpSpPr>
+        <a:xfrm>
+          <a:off x="0" y="0"/>
+          <a:ext cx="0" cy="0"/>
+          <a:chOff x="0" y="0"/>
+          <a:chExt cx="0" cy="0"/>
+        </a:xfrm>
+      </p:grpSpPr>
+      <p:pic>
+        <p:nvPicPr>
+          <p:cNvPr id="5" name="Picture 4">
+            <a:extLst>
+              <a:ext uri="{FF2B5EF4-FFF2-40B4-BE49-F238E27FC236}">
+                <a16:creationId xmlns:a16="http://schemas.microsoft.com/office/drawing/2014/main" id="{558453F9-F3C1-EDA3-6D83-43170A158A07}"/>
+              </a:ext>
+            </a:extLst>
+          </p:cNvPr>
+          <p:cNvPicPr>
+            <a:picLocks noChangeAspect="1"/>
+          </p:cNvPicPr>
+          <p:nvPr/>
+        </p:nvPicPr>
+        <p:blipFill rotWithShape="1">
+          <a:blip r:embed="rId2"/>
+          <a:srcRect t="10770" r="84371" b="20000"/>
+          <a:stretch/>
+        </p:blipFill>
+        <p:spPr>
+          <a:xfrm>
+            <a:off x="0" y="0"/>
+            <a:ext cx="1073997" cy="1175657"/>
+          </a:xfrm>
+          <a:prstGeom prst="rect">
+            <a:avLst/>
+          </a:prstGeom>
+        </p:spPr>
+      </p:pic>
+      <p:pic>
+        <p:nvPicPr>
+          <p:cNvPr id="6" name="Picture 5">
+            <a:extLst>
+              <a:ext uri="{FF2B5EF4-FFF2-40B4-BE49-F238E27FC236}">
+                <a16:creationId xmlns:a16="http://schemas.microsoft.com/office/drawing/2014/main" id="{CE1484BB-74DC-9E65-B32D-BE5FE2E385CD}"/>
+              </a:ext>
+            </a:extLst>
+          </p:cNvPr>
+          <p:cNvPicPr>
+            <a:picLocks noChangeAspect="1"/>
+          </p:cNvPicPr>
+          <p:nvPr/>
+        </p:nvPicPr>
+        <p:blipFill rotWithShape="1">
+          <a:blip r:embed="rId2"/>
+          <a:srcRect l="15172"/>
+          <a:stretch/>
+        </p:blipFill>
+        <p:spPr>
+          <a:xfrm>
+            <a:off x="9949987" y="0"/>
+            <a:ext cx="2242014" cy="653143"/>
+          </a:xfrm>
+          <a:prstGeom prst="rect">
+            <a:avLst/>
+          </a:prstGeom>
+        </p:spPr>
+      </p:pic>
+      <p:sp>
+        <p:nvSpPr>
+          <p:cNvPr id="7" name="TextBox 6">
+            <a:extLst>
+              <a:ext uri="{FF2B5EF4-FFF2-40B4-BE49-F238E27FC236}">
+                <a16:creationId xmlns:a16="http://schemas.microsoft.com/office/drawing/2014/main" id="{9EECCCD9-8AD5-9916-BC29-771066C9EE70}"/>
+              </a:ext>
+            </a:extLst>
+          </p:cNvPr>
+          <p:cNvSpPr txBox="1"/>
+          <p:nvPr/>
+        </p:nvSpPr>
+        <p:spPr>
+          <a:xfrm>
+            <a:off x="1" y="470259"/>
+            <a:ext cx="12192000" cy="1631216"/>
+          </a:xfrm>
+          <a:prstGeom prst="rect">
+            <a:avLst/>
+          </a:prstGeom>
+          <a:noFill/>
+        </p:spPr>
+        <p:txBody>
+          <a:bodyPr wrap="square" rtlCol="0">
+            <a:spAutoFit/>
+          </a:bodyPr>
+          <a:lstStyle/>
+          <a:p>
+            <a:pPr algn="ctr"/>
+            <a:r>
+              <a:rPr lang="en-US" sz="5000" b="1" dirty="0">
+                <a:solidFill>
+                  <a:srgbClr val="002060"/>
+                </a:solidFill>
+              </a:rPr>
+              <a:t>Lasso Regression</a:t>
+            </a:r>
+          </a:p>
+          <a:p>
+            <a:pPr algn="ctr"/>
+            <a:endParaRPr lang="en-US" sz="5000" dirty="0">
+              <a:solidFill>
+                <a:srgbClr val="002060"/>
+              </a:solidFill>
+            </a:endParaRPr>
+          </a:p>
+        </p:txBody>
+      </p:sp>
+      <p:cxnSp>
+        <p:nvCxnSpPr>
+          <p:cNvPr id="9" name="Straight Connector 8">
+            <a:extLst>
+              <a:ext uri="{FF2B5EF4-FFF2-40B4-BE49-F238E27FC236}">
+                <a16:creationId xmlns:a16="http://schemas.microsoft.com/office/drawing/2014/main" id="{450EE6D2-7381-B11A-A20A-0D5D0904DD35}"/>
+              </a:ext>
+            </a:extLst>
+          </p:cNvPr>
+          <p:cNvCxnSpPr>
+            <a:cxnSpLocks/>
+          </p:cNvCxnSpPr>
+          <p:nvPr/>
+        </p:nvCxnSpPr>
+        <p:spPr>
+          <a:xfrm>
+            <a:off x="757647" y="1332033"/>
+            <a:ext cx="10659291" cy="0"/>
+          </a:xfrm>
+          <a:prstGeom prst="line">
+            <a:avLst/>
+          </a:prstGeom>
+          <a:ln w="57150">
+            <a:solidFill>
+              <a:srgbClr val="002060"/>
+            </a:solidFill>
+          </a:ln>
+        </p:spPr>
+        <p:style>
+          <a:lnRef idx="1">
+            <a:schemeClr val="accent1"/>
+          </a:lnRef>
+          <a:fillRef idx="0">
+            <a:schemeClr val="accent1"/>
+          </a:fillRef>
+          <a:effectRef idx="0">
+            <a:schemeClr val="accent1"/>
+          </a:effectRef>
+          <a:fontRef idx="minor">
+            <a:schemeClr val="tx1"/>
+          </a:fontRef>
+        </p:style>
+      </p:cxnSp>
+    </p:spTree>
+    <p:extLst>
+      <p:ext uri="{BB962C8B-B14F-4D97-AF65-F5344CB8AC3E}">
+        <p14:creationId xmlns:p14="http://schemas.microsoft.com/office/powerpoint/2010/main" val="1893722804"/>
+      </p:ext>
+    </p:extLst>
+  </p:cSld>
+  <p:clrMapOvr>
+    <a:masterClrMapping/>
+  </p:clrMapOvr>
+</p:sld>
+</file>
+
+<file path=ppt/slides/slide26.xml><?xml version="1.0" encoding="utf-8"?>
+<p:sld xmlns:a="http://schemas.openxmlformats.org/drawingml/2006/main" xmlns:r="http://schemas.openxmlformats.org/officeDocument/2006/relationships" xmlns:p="http://schemas.openxmlformats.org/presentationml/2006/main">
+  <p:cSld>
+    <p:bg>
+      <p:bgPr>
+        <a:solidFill>
+          <a:srgbClr val="103B5E"/>
+        </a:solidFill>
+        <a:effectLst/>
+      </p:bgPr>
+    </p:bg>
+    <p:spTree>
+      <p:nvGrpSpPr>
+        <p:cNvPr id="1" name=""/>
+        <p:cNvGrpSpPr/>
+        <p:nvPr/>
+      </p:nvGrpSpPr>
+      <p:grpSpPr>
+        <a:xfrm>
+          <a:off x="0" y="0"/>
+          <a:ext cx="0" cy="0"/>
+          <a:chOff x="0" y="0"/>
+          <a:chExt cx="0" cy="0"/>
+        </a:xfrm>
+      </p:grpSpPr>
+      <p:sp>
+        <p:nvSpPr>
+          <p:cNvPr id="32" name="TextBox 31">
+            <a:extLst>
+              <a:ext uri="{FF2B5EF4-FFF2-40B4-BE49-F238E27FC236}">
+                <a16:creationId xmlns:a16="http://schemas.microsoft.com/office/drawing/2014/main" id="{0426EA6E-8DCD-68BB-CC42-016432ED85F5}"/>
+              </a:ext>
+            </a:extLst>
+          </p:cNvPr>
+          <p:cNvSpPr txBox="1"/>
+          <p:nvPr/>
+        </p:nvSpPr>
+        <p:spPr>
+          <a:xfrm>
+            <a:off x="0" y="2367155"/>
+            <a:ext cx="12192001" cy="1015663"/>
+          </a:xfrm>
+          <a:prstGeom prst="rect">
+            <a:avLst/>
+          </a:prstGeom>
+          <a:noFill/>
+        </p:spPr>
+        <p:txBody>
+          <a:bodyPr wrap="square" rtlCol="0">
+            <a:spAutoFit/>
+          </a:bodyPr>
+          <a:lstStyle/>
+          <a:p>
+            <a:pPr algn="ctr"/>
+            <a:r>
+              <a:rPr lang="en-US" sz="6000" dirty="0">
+                <a:solidFill>
+                  <a:schemeClr val="bg1"/>
+                </a:solidFill>
+              </a:rPr>
+              <a:t>Questions?</a:t>
+            </a:r>
+          </a:p>
+        </p:txBody>
+      </p:sp>
+    </p:spTree>
+    <p:extLst>
+      <p:ext uri="{BB962C8B-B14F-4D97-AF65-F5344CB8AC3E}">
+        <p14:creationId xmlns:p14="http://schemas.microsoft.com/office/powerpoint/2010/main" val="1924305025"/>
       </p:ext>
     </p:extLst>
   </p:cSld>
@@ -9142,10 +11077,10 @@
       </p:cxnSp>
       <p:pic>
         <p:nvPicPr>
-          <p:cNvPr id="3" name="Picture 2">
-            <a:extLst>
-              <a:ext uri="{FF2B5EF4-FFF2-40B4-BE49-F238E27FC236}">
-                <a16:creationId xmlns:a16="http://schemas.microsoft.com/office/drawing/2014/main" id="{24A566D1-EDB7-3CD8-1042-3CF3AA4FAB5B}"/>
+          <p:cNvPr id="4" name="Picture 3" descr="Chart, histogram&#10;&#10;Description automatically generated">
+            <a:extLst>
+              <a:ext uri="{FF2B5EF4-FFF2-40B4-BE49-F238E27FC236}">
+                <a16:creationId xmlns:a16="http://schemas.microsoft.com/office/drawing/2014/main" id="{73CDEF51-C86E-A53A-584B-462E7F8050F3}"/>
               </a:ext>
             </a:extLst>
           </p:cNvPr>
@@ -9168,8 +11103,8 @@
         </p:blipFill>
         <p:spPr>
           <a:xfrm>
-            <a:off x="-3139" y="1612439"/>
-            <a:ext cx="6099140" cy="4796681"/>
+            <a:off x="0" y="1938386"/>
+            <a:ext cx="6291072" cy="3931920"/>
           </a:xfrm>
           <a:prstGeom prst="rect">
             <a:avLst/>
@@ -9178,10 +11113,10 @@
       </p:pic>
       <p:pic>
         <p:nvPicPr>
-          <p:cNvPr id="8" name="Picture 7">
-            <a:extLst>
-              <a:ext uri="{FF2B5EF4-FFF2-40B4-BE49-F238E27FC236}">
-                <a16:creationId xmlns:a16="http://schemas.microsoft.com/office/drawing/2014/main" id="{ECEA4425-9121-CF8E-7978-465DDB531BD0}"/>
+          <p:cNvPr id="11" name="Picture 10" descr="Chart&#10;&#10;Description automatically generated">
+            <a:extLst>
+              <a:ext uri="{FF2B5EF4-FFF2-40B4-BE49-F238E27FC236}">
+                <a16:creationId xmlns:a16="http://schemas.microsoft.com/office/drawing/2014/main" id="{4F87C4B4-1828-0C98-CD86-BD59865B512E}"/>
               </a:ext>
             </a:extLst>
           </p:cNvPr>
@@ -9204,8 +11139,8 @@
         </p:blipFill>
         <p:spPr>
           <a:xfrm>
-            <a:off x="6096000" y="1768816"/>
-            <a:ext cx="5897703" cy="4796681"/>
+            <a:off x="6377813" y="1938386"/>
+            <a:ext cx="5504688" cy="3931920"/>
           </a:xfrm>
           <a:prstGeom prst="rect">
             <a:avLst/>
@@ -9385,10 +11320,10 @@
       </p:cxnSp>
       <p:pic>
         <p:nvPicPr>
-          <p:cNvPr id="3" name="Picture 2" descr="Chart, scatter chart&#10;&#10;Description automatically generated">
-            <a:extLst>
-              <a:ext uri="{FF2B5EF4-FFF2-40B4-BE49-F238E27FC236}">
-                <a16:creationId xmlns:a16="http://schemas.microsoft.com/office/drawing/2014/main" id="{C6E00983-99EE-B176-E749-4C4E4F4FA29A}"/>
+          <p:cNvPr id="4" name="Picture 3" descr="Chart, scatter chart&#10;&#10;Description automatically generated">
+            <a:extLst>
+              <a:ext uri="{FF2B5EF4-FFF2-40B4-BE49-F238E27FC236}">
+                <a16:creationId xmlns:a16="http://schemas.microsoft.com/office/drawing/2014/main" id="{1D4185D1-B8F4-4134-6604-97A3A15B2BB3}"/>
               </a:ext>
             </a:extLst>
           </p:cNvPr>
@@ -9397,7 +11332,7 @@
           </p:cNvPicPr>
           <p:nvPr/>
         </p:nvPicPr>
-        <p:blipFill rotWithShape="1">
+        <p:blipFill>
           <a:blip r:embed="rId3">
             <a:extLst>
               <a:ext uri="{28A0092B-C50C-407E-A947-70E740481C1C}">
@@ -9405,13 +11340,14 @@
               </a:ext>
             </a:extLst>
           </a:blip>
-          <a:srcRect t="4386" r="1798" b="5489"/>
-          <a:stretch/>
+          <a:stretch>
+            <a:fillRect/>
+          </a:stretch>
         </p:blipFill>
         <p:spPr>
           <a:xfrm>
-            <a:off x="3098232" y="1371600"/>
-            <a:ext cx="5978119" cy="5486400"/>
+            <a:off x="3184385" y="1432042"/>
+            <a:ext cx="5640201" cy="5640201"/>
           </a:xfrm>
           <a:prstGeom prst="rect">
             <a:avLst/>
@@ -9760,6 +11696,42 @@
           </a:fontRef>
         </p:style>
       </p:cxnSp>
+      <p:pic>
+        <p:nvPicPr>
+          <p:cNvPr id="3" name="Picture 2" descr="Diagram&#10;&#10;Description automatically generated">
+            <a:extLst>
+              <a:ext uri="{FF2B5EF4-FFF2-40B4-BE49-F238E27FC236}">
+                <a16:creationId xmlns:a16="http://schemas.microsoft.com/office/drawing/2014/main" id="{01B57A88-251B-9A39-CD97-C0909F551BD7}"/>
+              </a:ext>
+            </a:extLst>
+          </p:cNvPr>
+          <p:cNvPicPr>
+            <a:picLocks noChangeAspect="1"/>
+          </p:cNvPicPr>
+          <p:nvPr/>
+        </p:nvPicPr>
+        <p:blipFill>
+          <a:blip r:embed="rId3">
+            <a:extLst>
+              <a:ext uri="{28A0092B-C50C-407E-A947-70E740481C1C}">
+                <a14:useLocalDpi xmlns:a14="http://schemas.microsoft.com/office/drawing/2010/main" val="0"/>
+              </a:ext>
+            </a:extLst>
+          </a:blip>
+          <a:stretch>
+            <a:fillRect/>
+          </a:stretch>
+        </p:blipFill>
+        <p:spPr>
+          <a:xfrm>
+            <a:off x="2895576" y="1731706"/>
+            <a:ext cx="6400847" cy="4572033"/>
+          </a:xfrm>
+          <a:prstGeom prst="rect">
+            <a:avLst/>
+          </a:prstGeom>
+        </p:spPr>
+      </p:pic>
     </p:spTree>
     <p:extLst>
       <p:ext uri="{BB962C8B-B14F-4D97-AF65-F5344CB8AC3E}">
@@ -9805,7 +11777,7 @@
           <p:nvPr/>
         </p:nvPicPr>
         <p:blipFill rotWithShape="1">
-          <a:blip r:embed="rId2"/>
+          <a:blip r:embed="rId3"/>
           <a:srcRect t="10770" r="84371" b="20000"/>
           <a:stretch/>
         </p:blipFill>
@@ -9834,7 +11806,7 @@
           <p:nvPr/>
         </p:nvPicPr>
         <p:blipFill rotWithShape="1">
-          <a:blip r:embed="rId2"/>
+          <a:blip r:embed="rId3"/>
           <a:srcRect l="15172"/>
           <a:stretch/>
         </p:blipFill>
@@ -9931,6 +11903,36 @@
           </a:fontRef>
         </p:style>
       </p:cxnSp>
+      <p:pic>
+        <p:nvPicPr>
+          <p:cNvPr id="3" name="Picture 2">
+            <a:extLst>
+              <a:ext uri="{FF2B5EF4-FFF2-40B4-BE49-F238E27FC236}">
+                <a16:creationId xmlns:a16="http://schemas.microsoft.com/office/drawing/2014/main" id="{53197530-2E14-923C-E337-E1922138DA0D}"/>
+              </a:ext>
+            </a:extLst>
+          </p:cNvPr>
+          <p:cNvPicPr>
+            <a:picLocks noChangeAspect="1"/>
+          </p:cNvPicPr>
+          <p:nvPr/>
+        </p:nvPicPr>
+        <p:blipFill>
+          <a:blip r:embed="rId4"/>
+          <a:stretch>
+            <a:fillRect/>
+          </a:stretch>
+        </p:blipFill>
+        <p:spPr>
+          <a:xfrm>
+            <a:off x="4216303" y="1488409"/>
+            <a:ext cx="3759393" cy="5340624"/>
+          </a:xfrm>
+          <a:prstGeom prst="rect">
+            <a:avLst/>
+          </a:prstGeom>
+        </p:spPr>
+      </p:pic>
     </p:spTree>
     <p:extLst>
       <p:ext uri="{BB962C8B-B14F-4D97-AF65-F5344CB8AC3E}">

</xml_diff>

<commit_message>
more edits to classtree
more edits to classtree
</commit_message>
<xml_diff>
--- a/Project2/EDA_LendingClub_Slides - Project 2.pptx
+++ b/Project2/EDA_LendingClub_Slides - Project 2.pptx
@@ -5,7 +5,7 @@
     <p:sldMasterId id="2147483648" r:id="rId1"/>
   </p:sldMasterIdLst>
   <p:notesMasterIdLst>
-    <p:notesMasterId r:id="rId30"/>
+    <p:notesMasterId r:id="rId31"/>
   </p:notesMasterIdLst>
   <p:sldIdLst>
     <p:sldId id="257" r:id="rId2"/>
@@ -32,10 +32,11 @@
     <p:sldId id="309" r:id="rId23"/>
     <p:sldId id="301" r:id="rId24"/>
     <p:sldId id="297" r:id="rId25"/>
-    <p:sldId id="298" r:id="rId26"/>
-    <p:sldId id="302" r:id="rId27"/>
-    <p:sldId id="268" r:id="rId28"/>
-    <p:sldId id="263" r:id="rId29"/>
+    <p:sldId id="315" r:id="rId26"/>
+    <p:sldId id="298" r:id="rId27"/>
+    <p:sldId id="302" r:id="rId28"/>
+    <p:sldId id="268" r:id="rId29"/>
+    <p:sldId id="263" r:id="rId30"/>
   </p:sldIdLst>
   <p:sldSz cx="12192000" cy="6858000"/>
   <p:notesSz cx="6858000" cy="9144000"/>
@@ -224,7 +225,7 @@
           <a:p>
             <a:fld id="{48CCDE1B-485C-4B2F-BE21-3D867E8608CA}" type="datetimeFigureOut">
               <a:rPr lang="en-US" smtClean="0"/>
-              <a:t>12/10/2022</a:t>
+              <a:t>12/11/2022</a:t>
             </a:fld>
             <a:endParaRPr lang="en-US"/>
           </a:p>
@@ -1162,6 +1163,39 @@
           <a:bodyPr/>
           <a:lstStyle/>
           <a:p>
+            <a:r>
+              <a:rPr lang="en-US" dirty="0"/>
+              <a:t>Explain tree:</a:t>
+            </a:r>
+          </a:p>
+          <a:p>
+            <a:endParaRPr lang="en-US" dirty="0"/>
+          </a:p>
+          <a:p>
+            <a:r>
+              <a:rPr lang="en-US" dirty="0"/>
+              <a:t>Confusion Matrix:</a:t>
+            </a:r>
+          </a:p>
+          <a:p>
+            <a:r>
+              <a:rPr lang="en-US" dirty="0"/>
+              <a:t>The high area under ROC curve, sensitivity, and specificity values indicate a favorable ROC curve and a favorable model. </a:t>
+            </a:r>
+          </a:p>
+          <a:p>
+            <a:r>
+              <a:rPr lang="en-US" dirty="0"/>
+              <a:t>Based on the Kappa statistic of 0.93 we would evaluate this classifier as almost perfect agreement.</a:t>
+            </a:r>
+          </a:p>
+          <a:p>
+            <a:endParaRPr lang="en-US" dirty="0"/>
+          </a:p>
+          <a:p>
+            <a:endParaRPr lang="en-US" dirty="0"/>
+          </a:p>
+          <a:p>
             <a:endParaRPr lang="en-US" dirty="0"/>
           </a:p>
         </p:txBody>
@@ -1183,7 +1217,7 @@
           <a:p>
             <a:fld id="{6B053770-FD16-42CB-98BB-967786CBD56A}" type="slidenum">
               <a:rPr lang="en-US" smtClean="0"/>
-              <a:t>25</a:t>
+              <a:t>24</a:t>
             </a:fld>
             <a:endParaRPr lang="en-US"/>
           </a:p>
@@ -1192,7 +1226,7 @@
     </p:spTree>
     <p:extLst>
       <p:ext uri="{BB962C8B-B14F-4D97-AF65-F5344CB8AC3E}">
-        <p14:creationId xmlns:p14="http://schemas.microsoft.com/office/powerpoint/2010/main" val="2076041582"/>
+        <p14:creationId xmlns:p14="http://schemas.microsoft.com/office/powerpoint/2010/main" val="2295492974"/>
       </p:ext>
     </p:extLst>
   </p:cSld>
@@ -1246,6 +1280,54 @@
           <a:bodyPr/>
           <a:lstStyle/>
           <a:p>
+            <a:r>
+              <a:rPr lang="en-US" dirty="0"/>
+              <a:t>Explain tree:</a:t>
+            </a:r>
+          </a:p>
+          <a:p>
+            <a:endParaRPr lang="en-US" dirty="0"/>
+          </a:p>
+          <a:p>
+            <a:endParaRPr lang="en-US" dirty="0"/>
+          </a:p>
+          <a:p>
+            <a:r>
+              <a:rPr lang="en-US" dirty="0"/>
+              <a:t>Confusion Matrix:</a:t>
+            </a:r>
+          </a:p>
+          <a:p>
+            <a:endParaRPr lang="en-US" dirty="0"/>
+          </a:p>
+          <a:p>
+            <a:r>
+              <a:rPr lang="en-US" dirty="0"/>
+              <a:t>Low area under ROC curve indicates the model has little to no ability to discriminate between Paid and Unpaid classes.</a:t>
+            </a:r>
+          </a:p>
+          <a:p>
+            <a:endParaRPr lang="en-US" dirty="0"/>
+          </a:p>
+          <a:p>
+            <a:endParaRPr lang="en-US" dirty="0"/>
+          </a:p>
+          <a:p>
+            <a:r>
+              <a:rPr lang="en-US" dirty="0"/>
+              <a:t>Based on the extremely low Kappa statistic of .019, there is nearly no agreement between the predictive model and the actual data. </a:t>
+            </a:r>
+          </a:p>
+          <a:p>
+            <a:endParaRPr lang="en-US" dirty="0"/>
+          </a:p>
+          <a:p>
+            <a:endParaRPr lang="en-US" dirty="0"/>
+          </a:p>
+          <a:p>
+            <a:endParaRPr lang="en-US" dirty="0"/>
+          </a:p>
+          <a:p>
             <a:endParaRPr lang="en-US" dirty="0"/>
           </a:p>
         </p:txBody>
@@ -1267,7 +1349,7 @@
           <a:p>
             <a:fld id="{6B053770-FD16-42CB-98BB-967786CBD56A}" type="slidenum">
               <a:rPr lang="en-US" smtClean="0"/>
-              <a:t>26</a:t>
+              <a:t>25</a:t>
             </a:fld>
             <a:endParaRPr lang="en-US"/>
           </a:p>
@@ -1276,7 +1358,7 @@
     </p:spTree>
     <p:extLst>
       <p:ext uri="{BB962C8B-B14F-4D97-AF65-F5344CB8AC3E}">
-        <p14:creationId xmlns:p14="http://schemas.microsoft.com/office/powerpoint/2010/main" val="2940614858"/>
+        <p14:creationId xmlns:p14="http://schemas.microsoft.com/office/powerpoint/2010/main" val="2468590306"/>
       </p:ext>
     </p:extLst>
   </p:cSld>
@@ -1330,19 +1412,7 @@
           <a:bodyPr/>
           <a:lstStyle/>
           <a:p>
-            <a:r>
-              <a:rPr lang="en-US" dirty="0"/>
-              <a:t>From this we can see that about 13.2% of borrowers who met the credit underwriting criteria did not fully pay, while for the borrowers who did not meet the credit underwriting criteria about 27.8% did not fully pay.</a:t>
-            </a:r>
-          </a:p>
-          <a:p>
             <a:endParaRPr lang="en-US" dirty="0"/>
-          </a:p>
-          <a:p>
-            <a:r>
-              <a:rPr lang="en-US" dirty="0"/>
-              <a:t>This indicates borrowers who did not meet the credit underwriting criteria were almost twice as likely to be default on their loans than those who did meet the criteria. For comparison, default rates on loans from commercial banks for the same period as our dataset averaged 4.48%, with a maximum default rate of 7.49% default rate towards the end of 2009, according to the St. Louis Federal Reserve Bank.</a:t>
-            </a:r>
           </a:p>
         </p:txBody>
       </p:sp>
@@ -1363,7 +1433,187 @@
           <a:p>
             <a:fld id="{6B053770-FD16-42CB-98BB-967786CBD56A}" type="slidenum">
               <a:rPr lang="en-US" smtClean="0"/>
+              <a:t>26</a:t>
+            </a:fld>
+            <a:endParaRPr lang="en-US"/>
+          </a:p>
+        </p:txBody>
+      </p:sp>
+    </p:spTree>
+    <p:extLst>
+      <p:ext uri="{BB962C8B-B14F-4D97-AF65-F5344CB8AC3E}">
+        <p14:creationId xmlns:p14="http://schemas.microsoft.com/office/powerpoint/2010/main" val="2076041582"/>
+      </p:ext>
+    </p:extLst>
+  </p:cSld>
+  <p:clrMapOvr>
+    <a:masterClrMapping/>
+  </p:clrMapOvr>
+</p:notes>
+</file>
+
+<file path=ppt/notesSlides/notesSlide8.xml><?xml version="1.0" encoding="utf-8"?>
+<p:notes xmlns:a="http://schemas.openxmlformats.org/drawingml/2006/main" xmlns:r="http://schemas.openxmlformats.org/officeDocument/2006/relationships" xmlns:p="http://schemas.openxmlformats.org/presentationml/2006/main">
+  <p:cSld>
+    <p:spTree>
+      <p:nvGrpSpPr>
+        <p:cNvPr id="1" name=""/>
+        <p:cNvGrpSpPr/>
+        <p:nvPr/>
+      </p:nvGrpSpPr>
+      <p:grpSpPr>
+        <a:xfrm>
+          <a:off x="0" y="0"/>
+          <a:ext cx="0" cy="0"/>
+          <a:chOff x="0" y="0"/>
+          <a:chExt cx="0" cy="0"/>
+        </a:xfrm>
+      </p:grpSpPr>
+      <p:sp>
+        <p:nvSpPr>
+          <p:cNvPr id="2" name="Slide Image Placeholder 1"/>
+          <p:cNvSpPr>
+            <a:spLocks noGrp="1" noRot="1" noChangeAspect="1"/>
+          </p:cNvSpPr>
+          <p:nvPr>
+            <p:ph type="sldImg"/>
+          </p:nvPr>
+        </p:nvSpPr>
+        <p:spPr/>
+      </p:sp>
+      <p:sp>
+        <p:nvSpPr>
+          <p:cNvPr id="3" name="Notes Placeholder 2"/>
+          <p:cNvSpPr>
+            <a:spLocks noGrp="1"/>
+          </p:cNvSpPr>
+          <p:nvPr>
+            <p:ph type="body" idx="1"/>
+          </p:nvPr>
+        </p:nvSpPr>
+        <p:spPr/>
+        <p:txBody>
+          <a:bodyPr/>
+          <a:lstStyle/>
+          <a:p>
+            <a:endParaRPr lang="en-US" dirty="0"/>
+          </a:p>
+        </p:txBody>
+      </p:sp>
+      <p:sp>
+        <p:nvSpPr>
+          <p:cNvPr id="4" name="Slide Number Placeholder 3"/>
+          <p:cNvSpPr>
+            <a:spLocks noGrp="1"/>
+          </p:cNvSpPr>
+          <p:nvPr>
+            <p:ph type="sldNum" sz="quarter" idx="5"/>
+          </p:nvPr>
+        </p:nvSpPr>
+        <p:spPr/>
+        <p:txBody>
+          <a:bodyPr/>
+          <a:lstStyle/>
+          <a:p>
+            <a:fld id="{6B053770-FD16-42CB-98BB-967786CBD56A}" type="slidenum">
+              <a:rPr lang="en-US" smtClean="0"/>
               <a:t>27</a:t>
+            </a:fld>
+            <a:endParaRPr lang="en-US"/>
+          </a:p>
+        </p:txBody>
+      </p:sp>
+    </p:spTree>
+    <p:extLst>
+      <p:ext uri="{BB962C8B-B14F-4D97-AF65-F5344CB8AC3E}">
+        <p14:creationId xmlns:p14="http://schemas.microsoft.com/office/powerpoint/2010/main" val="2940614858"/>
+      </p:ext>
+    </p:extLst>
+  </p:cSld>
+  <p:clrMapOvr>
+    <a:masterClrMapping/>
+  </p:clrMapOvr>
+</p:notes>
+</file>
+
+<file path=ppt/notesSlides/notesSlide9.xml><?xml version="1.0" encoding="utf-8"?>
+<p:notes xmlns:a="http://schemas.openxmlformats.org/drawingml/2006/main" xmlns:r="http://schemas.openxmlformats.org/officeDocument/2006/relationships" xmlns:p="http://schemas.openxmlformats.org/presentationml/2006/main">
+  <p:cSld>
+    <p:spTree>
+      <p:nvGrpSpPr>
+        <p:cNvPr id="1" name=""/>
+        <p:cNvGrpSpPr/>
+        <p:nvPr/>
+      </p:nvGrpSpPr>
+      <p:grpSpPr>
+        <a:xfrm>
+          <a:off x="0" y="0"/>
+          <a:ext cx="0" cy="0"/>
+          <a:chOff x="0" y="0"/>
+          <a:chExt cx="0" cy="0"/>
+        </a:xfrm>
+      </p:grpSpPr>
+      <p:sp>
+        <p:nvSpPr>
+          <p:cNvPr id="2" name="Slide Image Placeholder 1"/>
+          <p:cNvSpPr>
+            <a:spLocks noGrp="1" noRot="1" noChangeAspect="1"/>
+          </p:cNvSpPr>
+          <p:nvPr>
+            <p:ph type="sldImg"/>
+          </p:nvPr>
+        </p:nvSpPr>
+        <p:spPr/>
+      </p:sp>
+      <p:sp>
+        <p:nvSpPr>
+          <p:cNvPr id="3" name="Notes Placeholder 2"/>
+          <p:cNvSpPr>
+            <a:spLocks noGrp="1"/>
+          </p:cNvSpPr>
+          <p:nvPr>
+            <p:ph type="body" idx="1"/>
+          </p:nvPr>
+        </p:nvSpPr>
+        <p:spPr/>
+        <p:txBody>
+          <a:bodyPr/>
+          <a:lstStyle/>
+          <a:p>
+            <a:r>
+              <a:rPr lang="en-US" dirty="0"/>
+              <a:t>From this we can see that about 13.2% of borrowers who met the credit underwriting criteria did not fully pay, while for the borrowers who did not meet the credit underwriting criteria about 27.8% did not fully pay.</a:t>
+            </a:r>
+          </a:p>
+          <a:p>
+            <a:endParaRPr lang="en-US" dirty="0"/>
+          </a:p>
+          <a:p>
+            <a:r>
+              <a:rPr lang="en-US" dirty="0"/>
+              <a:t>This indicates borrowers who did not meet the credit underwriting criteria were almost twice as likely to be default on their loans than those who did meet the criteria. For comparison, default rates on loans from commercial banks for the same period as our dataset averaged 4.48%, with a maximum default rate of 7.49% default rate towards the end of 2009, according to the St. Louis Federal Reserve Bank.</a:t>
+            </a:r>
+          </a:p>
+        </p:txBody>
+      </p:sp>
+      <p:sp>
+        <p:nvSpPr>
+          <p:cNvPr id="4" name="Slide Number Placeholder 3"/>
+          <p:cNvSpPr>
+            <a:spLocks noGrp="1"/>
+          </p:cNvSpPr>
+          <p:nvPr>
+            <p:ph type="sldNum" sz="quarter" idx="5"/>
+          </p:nvPr>
+        </p:nvSpPr>
+        <p:spPr/>
+        <p:txBody>
+          <a:bodyPr/>
+          <a:lstStyle/>
+          <a:p>
+            <a:fld id="{6B053770-FD16-42CB-98BB-967786CBD56A}" type="slidenum">
+              <a:rPr lang="en-US" smtClean="0"/>
+              <a:t>28</a:t>
             </a:fld>
             <a:endParaRPr lang="en-US"/>
           </a:p>
@@ -1529,7 +1779,7 @@
           <a:p>
             <a:fld id="{995EAC03-283E-463E-BE2A-0031DB3AD91B}" type="datetimeFigureOut">
               <a:rPr lang="en-US" smtClean="0"/>
-              <a:t>12/10/2022</a:t>
+              <a:t>12/11/2022</a:t>
             </a:fld>
             <a:endParaRPr lang="en-US"/>
           </a:p>
@@ -1727,7 +1977,7 @@
           <a:p>
             <a:fld id="{995EAC03-283E-463E-BE2A-0031DB3AD91B}" type="datetimeFigureOut">
               <a:rPr lang="en-US" smtClean="0"/>
-              <a:t>12/10/2022</a:t>
+              <a:t>12/11/2022</a:t>
             </a:fld>
             <a:endParaRPr lang="en-US"/>
           </a:p>
@@ -1935,7 +2185,7 @@
           <a:p>
             <a:fld id="{995EAC03-283E-463E-BE2A-0031DB3AD91B}" type="datetimeFigureOut">
               <a:rPr lang="en-US" smtClean="0"/>
-              <a:t>12/10/2022</a:t>
+              <a:t>12/11/2022</a:t>
             </a:fld>
             <a:endParaRPr lang="en-US"/>
           </a:p>
@@ -2133,7 +2383,7 @@
           <a:p>
             <a:fld id="{995EAC03-283E-463E-BE2A-0031DB3AD91B}" type="datetimeFigureOut">
               <a:rPr lang="en-US" smtClean="0"/>
-              <a:t>12/10/2022</a:t>
+              <a:t>12/11/2022</a:t>
             </a:fld>
             <a:endParaRPr lang="en-US"/>
           </a:p>
@@ -2408,7 +2658,7 @@
           <a:p>
             <a:fld id="{995EAC03-283E-463E-BE2A-0031DB3AD91B}" type="datetimeFigureOut">
               <a:rPr lang="en-US" smtClean="0"/>
-              <a:t>12/10/2022</a:t>
+              <a:t>12/11/2022</a:t>
             </a:fld>
             <a:endParaRPr lang="en-US"/>
           </a:p>
@@ -2673,7 +2923,7 @@
           <a:p>
             <a:fld id="{995EAC03-283E-463E-BE2A-0031DB3AD91B}" type="datetimeFigureOut">
               <a:rPr lang="en-US" smtClean="0"/>
-              <a:t>12/10/2022</a:t>
+              <a:t>12/11/2022</a:t>
             </a:fld>
             <a:endParaRPr lang="en-US"/>
           </a:p>
@@ -3085,7 +3335,7 @@
           <a:p>
             <a:fld id="{995EAC03-283E-463E-BE2A-0031DB3AD91B}" type="datetimeFigureOut">
               <a:rPr lang="en-US" smtClean="0"/>
-              <a:t>12/10/2022</a:t>
+              <a:t>12/11/2022</a:t>
             </a:fld>
             <a:endParaRPr lang="en-US"/>
           </a:p>
@@ -3226,7 +3476,7 @@
           <a:p>
             <a:fld id="{995EAC03-283E-463E-BE2A-0031DB3AD91B}" type="datetimeFigureOut">
               <a:rPr lang="en-US" smtClean="0"/>
-              <a:t>12/10/2022</a:t>
+              <a:t>12/11/2022</a:t>
             </a:fld>
             <a:endParaRPr lang="en-US"/>
           </a:p>
@@ -3339,7 +3589,7 @@
           <a:p>
             <a:fld id="{995EAC03-283E-463E-BE2A-0031DB3AD91B}" type="datetimeFigureOut">
               <a:rPr lang="en-US" smtClean="0"/>
-              <a:t>12/10/2022</a:t>
+              <a:t>12/11/2022</a:t>
             </a:fld>
             <a:endParaRPr lang="en-US"/>
           </a:p>
@@ -3650,7 +3900,7 @@
           <a:p>
             <a:fld id="{995EAC03-283E-463E-BE2A-0031DB3AD91B}" type="datetimeFigureOut">
               <a:rPr lang="en-US" smtClean="0"/>
-              <a:t>12/10/2022</a:t>
+              <a:t>12/11/2022</a:t>
             </a:fld>
             <a:endParaRPr lang="en-US"/>
           </a:p>
@@ -3938,7 +4188,7 @@
           <a:p>
             <a:fld id="{995EAC03-283E-463E-BE2A-0031DB3AD91B}" type="datetimeFigureOut">
               <a:rPr lang="en-US" smtClean="0"/>
-              <a:t>12/10/2022</a:t>
+              <a:t>12/11/2022</a:t>
             </a:fld>
             <a:endParaRPr lang="en-US"/>
           </a:p>
@@ -4179,7 +4429,7 @@
           <a:p>
             <a:fld id="{995EAC03-283E-463E-BE2A-0031DB3AD91B}" type="datetimeFigureOut">
               <a:rPr lang="en-US" smtClean="0"/>
-              <a:t>12/10/2022</a:t>
+              <a:t>12/11/2022</a:t>
             </a:fld>
             <a:endParaRPr lang="en-US"/>
           </a:p>
@@ -9119,7 +9369,7 @@
           <p:nvPr/>
         </p:nvPicPr>
         <p:blipFill rotWithShape="1">
-          <a:blip r:embed="rId2"/>
+          <a:blip r:embed="rId3"/>
           <a:srcRect t="10770" r="84371" b="20000"/>
           <a:stretch/>
         </p:blipFill>
@@ -9148,7 +9398,7 @@
           <p:nvPr/>
         </p:nvPicPr>
         <p:blipFill rotWithShape="1">
-          <a:blip r:embed="rId2"/>
+          <a:blip r:embed="rId3"/>
           <a:srcRect l="15172"/>
           <a:stretch/>
         </p:blipFill>
@@ -9197,7 +9447,7 @@
                   <a:srgbClr val="002060"/>
                 </a:solidFill>
               </a:rPr>
-              <a:t>Classification Tree – Visual Tree</a:t>
+              <a:t>Classification Tree – Credit Policy</a:t>
             </a:r>
           </a:p>
         </p:txBody>
@@ -9260,7 +9510,7 @@
           <p:nvPr/>
         </p:nvPicPr>
         <p:blipFill>
-          <a:blip r:embed="rId3">
+          <a:blip r:embed="rId4">
             <a:extLst>
               <a:ext uri="{28A0092B-C50C-407E-A947-70E740481C1C}">
                 <a14:useLocalDpi xmlns:a14="http://schemas.microsoft.com/office/drawing/2010/main" val="0"/>
@@ -9273,7 +9523,7 @@
         </p:blipFill>
         <p:spPr>
           <a:xfrm>
-            <a:off x="2895576" y="1691011"/>
+            <a:off x="-1239696" y="7641434"/>
             <a:ext cx="6400847" cy="4572033"/>
           </a:xfrm>
           <a:prstGeom prst="rect">
@@ -9295,8 +9545,8 @@
         </p:nvSpPr>
         <p:spPr>
           <a:xfrm>
-            <a:off x="5389344" y="6078378"/>
-            <a:ext cx="1395895" cy="369332"/>
+            <a:off x="256606" y="2187743"/>
+            <a:ext cx="4465049" cy="4185761"/>
           </a:xfrm>
           <a:prstGeom prst="rect">
             <a:avLst/>
@@ -9304,14 +9554,206 @@
           <a:noFill/>
         </p:spPr>
         <p:txBody>
-          <a:bodyPr wrap="none" rtlCol="0">
+          <a:bodyPr wrap="square" rtlCol="0">
             <a:spAutoFit/>
           </a:bodyPr>
           <a:lstStyle/>
           <a:p>
+            <a:pPr marL="285750" indent="-285750">
+              <a:buFont typeface="Arial" panose="020B0604020202020204" pitchFamily="34" charset="0"/>
+              <a:buChar char="•"/>
+            </a:pPr>
+            <a:r>
+              <a:rPr lang="en-US" sz="1900" b="1" dirty="0"/>
+              <a:t>Tree</a:t>
+            </a:r>
+          </a:p>
+          <a:p>
+            <a:pPr marL="742950" lvl="1" indent="-285750">
+              <a:buFont typeface="Arial" panose="020B0604020202020204" pitchFamily="34" charset="0"/>
+              <a:buChar char="•"/>
+            </a:pPr>
+            <a:r>
+              <a:rPr lang="en-US" sz="1900" dirty="0"/>
+              <a:t>Four variables</a:t>
+            </a:r>
+          </a:p>
+          <a:p>
+            <a:pPr marL="742950" lvl="1" indent="-285750">
+              <a:buFont typeface="Arial" panose="020B0604020202020204" pitchFamily="34" charset="0"/>
+              <a:buChar char="•"/>
+            </a:pPr>
+            <a:r>
+              <a:rPr lang="en-US" sz="1900" dirty="0"/>
+              <a:t>5 splits</a:t>
+            </a:r>
+          </a:p>
+          <a:p>
+            <a:pPr marL="742950" lvl="1" indent="-285750">
+              <a:buFont typeface="Arial" panose="020B0604020202020204" pitchFamily="34" charset="0"/>
+              <a:buChar char="•"/>
+            </a:pPr>
+            <a:endParaRPr lang="en-US" sz="1900" dirty="0"/>
+          </a:p>
+          <a:p>
+            <a:pPr marL="285750" indent="-285750">
+              <a:buFont typeface="Arial" panose="020B0604020202020204" pitchFamily="34" charset="0"/>
+              <a:buChar char="•"/>
+            </a:pPr>
+            <a:r>
+              <a:rPr lang="en-US" sz="1900" b="1" dirty="0"/>
+              <a:t>Confusion Matrix</a:t>
+            </a:r>
+          </a:p>
+          <a:p>
+            <a:pPr marL="742950" lvl="1" indent="-285750">
+              <a:buFont typeface="Arial" panose="020B0604020202020204" pitchFamily="34" charset="0"/>
+              <a:buChar char="•"/>
+            </a:pPr>
+            <a:r>
+              <a:rPr lang="en-US" sz="1900" dirty="0"/>
+              <a:t>Kappa: 0.926</a:t>
+            </a:r>
+          </a:p>
+          <a:p>
+            <a:pPr marL="742950" lvl="1" indent="-285750">
+              <a:buFont typeface="Arial" panose="020B0604020202020204" pitchFamily="34" charset="0"/>
+              <a:buChar char="•"/>
+            </a:pPr>
+            <a:r>
+              <a:rPr lang="en-US" sz="1900" dirty="0"/>
+              <a:t>Sensitivity: 0.899</a:t>
+            </a:r>
+          </a:p>
+          <a:p>
+            <a:pPr marL="742950" lvl="1" indent="-285750">
+              <a:buFont typeface="Arial" panose="020B0604020202020204" pitchFamily="34" charset="0"/>
+              <a:buChar char="•"/>
+            </a:pPr>
+            <a:r>
+              <a:rPr lang="en-US" sz="1900" dirty="0"/>
+              <a:t>Specificity: 0.997</a:t>
+            </a:r>
+          </a:p>
+          <a:p>
+            <a:pPr marL="742950" lvl="1" indent="-285750">
+              <a:buFont typeface="Arial" panose="020B0604020202020204" pitchFamily="34" charset="0"/>
+              <a:buChar char="•"/>
+            </a:pPr>
+            <a:r>
+              <a:rPr lang="en-US" sz="1900" dirty="0"/>
+              <a:t>AUC: 0.953</a:t>
+            </a:r>
+          </a:p>
+          <a:p>
+            <a:pPr marL="285750" indent="-285750">
+              <a:buFont typeface="Arial" panose="020B0604020202020204" pitchFamily="34" charset="0"/>
+              <a:buChar char="•"/>
+            </a:pPr>
+            <a:endParaRPr lang="en-US" sz="1900" dirty="0"/>
+          </a:p>
+          <a:p>
+            <a:pPr marL="285750" indent="-285750">
+              <a:buFont typeface="Arial" panose="020B0604020202020204" pitchFamily="34" charset="0"/>
+              <a:buChar char="•"/>
+            </a:pPr>
+            <a:r>
+              <a:rPr lang="en-US" sz="1900" b="1" dirty="0"/>
+              <a:t>Predictions vs Actual</a:t>
+            </a:r>
+          </a:p>
+          <a:p>
+            <a:pPr marL="742950" lvl="1" indent="-285750">
+              <a:buFont typeface="Arial" panose="020B0604020202020204" pitchFamily="34" charset="0"/>
+              <a:buChar char="•"/>
+            </a:pPr>
+            <a:r>
+              <a:rPr lang="en-US" sz="1900" dirty="0"/>
+              <a:t>1677/1868 true negatives (Fails)</a:t>
+            </a:r>
+          </a:p>
+          <a:p>
+            <a:pPr marL="742950" lvl="1" indent="-285750">
+              <a:buFont typeface="Arial" panose="020B0604020202020204" pitchFamily="34" charset="0"/>
+              <a:buChar char="•"/>
+            </a:pPr>
+            <a:r>
+              <a:rPr lang="en-US" sz="1900" dirty="0"/>
+              <a:t>7686/7710 true positives (Meets)</a:t>
+            </a:r>
+          </a:p>
+          <a:p>
+            <a:endParaRPr lang="en-US" sz="1900" dirty="0"/>
+          </a:p>
+        </p:txBody>
+      </p:sp>
+      <p:pic>
+        <p:nvPicPr>
+          <p:cNvPr id="8" name="Picture 7" descr="Diagram&#10;&#10;Description automatically generated with medium confidence">
+            <a:extLst>
+              <a:ext uri="{FF2B5EF4-FFF2-40B4-BE49-F238E27FC236}">
+                <a16:creationId xmlns:a16="http://schemas.microsoft.com/office/drawing/2014/main" id="{62EEE40D-1127-949A-7E32-45025E7A8021}"/>
+              </a:ext>
+            </a:extLst>
+          </p:cNvPr>
+          <p:cNvPicPr>
+            <a:picLocks noChangeAspect="1"/>
+          </p:cNvPicPr>
+          <p:nvPr/>
+        </p:nvPicPr>
+        <p:blipFill>
+          <a:blip r:embed="rId5">
+            <a:extLst>
+              <a:ext uri="{28A0092B-C50C-407E-A947-70E740481C1C}">
+                <a14:useLocalDpi xmlns:a14="http://schemas.microsoft.com/office/drawing/2010/main" val="0"/>
+              </a:ext>
+            </a:extLst>
+          </a:blip>
+          <a:stretch>
+            <a:fillRect/>
+          </a:stretch>
+        </p:blipFill>
+        <p:spPr>
+          <a:xfrm>
+            <a:off x="4421031" y="1391408"/>
+            <a:ext cx="7583080" cy="5416485"/>
+          </a:xfrm>
+          <a:prstGeom prst="rect">
+            <a:avLst/>
+          </a:prstGeom>
+        </p:spPr>
+      </p:pic>
+      <p:sp>
+        <p:nvSpPr>
+          <p:cNvPr id="13" name="TextBox 12">
+            <a:extLst>
+              <a:ext uri="{FF2B5EF4-FFF2-40B4-BE49-F238E27FC236}">
+                <a16:creationId xmlns:a16="http://schemas.microsoft.com/office/drawing/2014/main" id="{49BAB6AF-47C0-476A-3F2B-9D5A37330C88}"/>
+              </a:ext>
+            </a:extLst>
+          </p:cNvPr>
+          <p:cNvSpPr txBox="1"/>
+          <p:nvPr/>
+        </p:nvSpPr>
+        <p:spPr>
+          <a:xfrm>
+            <a:off x="5680881" y="7827328"/>
+            <a:ext cx="6093724" cy="1200329"/>
+          </a:xfrm>
+          <a:prstGeom prst="rect">
+            <a:avLst/>
+          </a:prstGeom>
+          <a:noFill/>
+        </p:spPr>
+        <p:txBody>
+          <a:bodyPr wrap="square">
+            <a:spAutoFit/>
+          </a:bodyPr>
+          <a:lstStyle/>
+          <a:p>
             <a:r>
               <a:rPr lang="en-US" dirty="0"/>
-              <a:t>Kappa = 0.83</a:t>
+              <a:t>The kappa coefficient measures the agreement between classification and truth values. A kappa value of 1 represents perfect agreement, while a value of 0 represents no agreement.</a:t>
             </a:r>
           </a:p>
         </p:txBody>
@@ -9439,7 +9881,7 @@
                   <a:srgbClr val="002060"/>
                 </a:solidFill>
               </a:rPr>
-              <a:t>Classification Tree – Confusion Matrix</a:t>
+              <a:t>Classification Tree – Not Fully Paid</a:t>
             </a:r>
           </a:p>
         </p:txBody>
@@ -9489,10 +9931,10 @@
       </p:cxnSp>
       <p:pic>
         <p:nvPicPr>
-          <p:cNvPr id="3" name="Picture 2">
-            <a:extLst>
-              <a:ext uri="{FF2B5EF4-FFF2-40B4-BE49-F238E27FC236}">
-                <a16:creationId xmlns:a16="http://schemas.microsoft.com/office/drawing/2014/main" id="{53197530-2E14-923C-E337-E1922138DA0D}"/>
+          <p:cNvPr id="3" name="Picture 2" descr="Diagram&#10;&#10;Description automatically generated">
+            <a:extLst>
+              <a:ext uri="{FF2B5EF4-FFF2-40B4-BE49-F238E27FC236}">
+                <a16:creationId xmlns:a16="http://schemas.microsoft.com/office/drawing/2014/main" id="{01B57A88-251B-9A39-CD97-C0909F551BD7}"/>
               </a:ext>
             </a:extLst>
           </p:cNvPr>
@@ -9502,15 +9944,258 @@
           <p:nvPr/>
         </p:nvPicPr>
         <p:blipFill>
-          <a:blip r:embed="rId4"/>
+          <a:blip r:embed="rId4">
+            <a:extLst>
+              <a:ext uri="{28A0092B-C50C-407E-A947-70E740481C1C}">
+                <a14:useLocalDpi xmlns:a14="http://schemas.microsoft.com/office/drawing/2010/main" val="0"/>
+              </a:ext>
+            </a:extLst>
+          </a:blip>
           <a:stretch>
             <a:fillRect/>
           </a:stretch>
         </p:blipFill>
         <p:spPr>
           <a:xfrm>
-            <a:off x="4216303" y="1488409"/>
-            <a:ext cx="3759393" cy="5340624"/>
+            <a:off x="-1239696" y="7641434"/>
+            <a:ext cx="6400847" cy="4572033"/>
+          </a:xfrm>
+          <a:prstGeom prst="rect">
+            <a:avLst/>
+          </a:prstGeom>
+        </p:spPr>
+      </p:pic>
+      <p:sp>
+        <p:nvSpPr>
+          <p:cNvPr id="2" name="TextBox 1">
+            <a:extLst>
+              <a:ext uri="{FF2B5EF4-FFF2-40B4-BE49-F238E27FC236}">
+                <a16:creationId xmlns:a16="http://schemas.microsoft.com/office/drawing/2014/main" id="{769B97F2-949C-6AED-5947-79C707840323}"/>
+              </a:ext>
+            </a:extLst>
+          </p:cNvPr>
+          <p:cNvSpPr txBox="1"/>
+          <p:nvPr/>
+        </p:nvSpPr>
+        <p:spPr>
+          <a:xfrm>
+            <a:off x="256606" y="2187743"/>
+            <a:ext cx="4465049" cy="4478149"/>
+          </a:xfrm>
+          <a:prstGeom prst="rect">
+            <a:avLst/>
+          </a:prstGeom>
+          <a:noFill/>
+        </p:spPr>
+        <p:txBody>
+          <a:bodyPr wrap="square" rtlCol="0">
+            <a:spAutoFit/>
+          </a:bodyPr>
+          <a:lstStyle/>
+          <a:p>
+            <a:pPr marL="285750" indent="-285750">
+              <a:buFont typeface="Arial" panose="020B0604020202020204" pitchFamily="34" charset="0"/>
+              <a:buChar char="•"/>
+            </a:pPr>
+            <a:r>
+              <a:rPr lang="en-US" sz="1900" b="1" dirty="0"/>
+              <a:t>Tree</a:t>
+            </a:r>
+          </a:p>
+          <a:p>
+            <a:pPr marL="742950" lvl="1" indent="-285750">
+              <a:buFont typeface="Arial" panose="020B0604020202020204" pitchFamily="34" charset="0"/>
+              <a:buChar char="•"/>
+            </a:pPr>
+            <a:r>
+              <a:rPr lang="en-US" sz="1900" dirty="0"/>
+              <a:t>CP forced to .001</a:t>
+            </a:r>
+          </a:p>
+          <a:p>
+            <a:pPr marL="742950" lvl="1" indent="-285750">
+              <a:buFont typeface="Arial" panose="020B0604020202020204" pitchFamily="34" charset="0"/>
+              <a:buChar char="•"/>
+            </a:pPr>
+            <a:r>
+              <a:rPr lang="en-US" sz="1900" dirty="0"/>
+              <a:t>Four variables</a:t>
+            </a:r>
+          </a:p>
+          <a:p>
+            <a:pPr marL="742950" lvl="1" indent="-285750">
+              <a:buFont typeface="Arial" panose="020B0604020202020204" pitchFamily="34" charset="0"/>
+              <a:buChar char="•"/>
+            </a:pPr>
+            <a:r>
+              <a:rPr lang="en-US" sz="1900" dirty="0"/>
+              <a:t>4 splits</a:t>
+            </a:r>
+          </a:p>
+          <a:p>
+            <a:pPr marL="742950" lvl="1" indent="-285750">
+              <a:buFont typeface="Arial" panose="020B0604020202020204" pitchFamily="34" charset="0"/>
+              <a:buChar char="•"/>
+            </a:pPr>
+            <a:endParaRPr lang="en-US" sz="1900" dirty="0"/>
+          </a:p>
+          <a:p>
+            <a:pPr marL="285750" indent="-285750">
+              <a:buFont typeface="Arial" panose="020B0604020202020204" pitchFamily="34" charset="0"/>
+              <a:buChar char="•"/>
+            </a:pPr>
+            <a:r>
+              <a:rPr lang="en-US" sz="1900" b="1" dirty="0"/>
+              <a:t>Confusion Matrix</a:t>
+            </a:r>
+          </a:p>
+          <a:p>
+            <a:pPr marL="742950" lvl="1" indent="-285750">
+              <a:buFont typeface="Arial" panose="020B0604020202020204" pitchFamily="34" charset="0"/>
+              <a:buChar char="•"/>
+            </a:pPr>
+            <a:r>
+              <a:rPr lang="en-US" sz="1900" dirty="0"/>
+              <a:t>Sensitivity: 0.999</a:t>
+            </a:r>
+          </a:p>
+          <a:p>
+            <a:pPr marL="742950" lvl="1" indent="-285750">
+              <a:buFont typeface="Arial" panose="020B0604020202020204" pitchFamily="34" charset="0"/>
+              <a:buChar char="•"/>
+            </a:pPr>
+            <a:r>
+              <a:rPr lang="en-US" sz="1900" dirty="0"/>
+              <a:t>Specificity: 0.013</a:t>
+            </a:r>
+          </a:p>
+          <a:p>
+            <a:pPr marL="742950" lvl="1" indent="-285750">
+              <a:buFont typeface="Arial" panose="020B0604020202020204" pitchFamily="34" charset="0"/>
+              <a:buChar char="•"/>
+            </a:pPr>
+            <a:r>
+              <a:rPr lang="en-US" sz="1900" dirty="0"/>
+              <a:t>AUC: 0.59</a:t>
+            </a:r>
+          </a:p>
+          <a:p>
+            <a:pPr marL="742950" lvl="1" indent="-285750">
+              <a:buFont typeface="Arial" panose="020B0604020202020204" pitchFamily="34" charset="0"/>
+              <a:buChar char="•"/>
+            </a:pPr>
+            <a:r>
+              <a:rPr lang="en-US" sz="1900" dirty="0"/>
+              <a:t>Kappa: 0.019</a:t>
+            </a:r>
+          </a:p>
+          <a:p>
+            <a:pPr marL="285750" indent="-285750">
+              <a:buFont typeface="Arial" panose="020B0604020202020204" pitchFamily="34" charset="0"/>
+              <a:buChar char="•"/>
+            </a:pPr>
+            <a:endParaRPr lang="en-US" sz="1900" dirty="0"/>
+          </a:p>
+          <a:p>
+            <a:pPr marL="285750" indent="-285750">
+              <a:buFont typeface="Arial" panose="020B0604020202020204" pitchFamily="34" charset="0"/>
+              <a:buChar char="•"/>
+            </a:pPr>
+            <a:r>
+              <a:rPr lang="en-US" sz="1900" b="1" dirty="0"/>
+              <a:t>Predictions vs Actual</a:t>
+            </a:r>
+          </a:p>
+          <a:p>
+            <a:pPr marL="742950" lvl="1" indent="-285750">
+              <a:buFont typeface="Arial" panose="020B0604020202020204" pitchFamily="34" charset="0"/>
+              <a:buChar char="•"/>
+            </a:pPr>
+            <a:r>
+              <a:rPr lang="en-US" sz="1900" dirty="0"/>
+              <a:t>1677/1868 true negatives (Fails)</a:t>
+            </a:r>
+          </a:p>
+          <a:p>
+            <a:pPr marL="742950" lvl="1" indent="-285750">
+              <a:buFont typeface="Arial" panose="020B0604020202020204" pitchFamily="34" charset="0"/>
+              <a:buChar char="•"/>
+            </a:pPr>
+            <a:r>
+              <a:rPr lang="en-US" sz="1900" dirty="0"/>
+              <a:t>7686/7710 true positives (Meets)</a:t>
+            </a:r>
+          </a:p>
+          <a:p>
+            <a:endParaRPr lang="en-US" sz="1900" dirty="0"/>
+          </a:p>
+        </p:txBody>
+      </p:sp>
+      <p:sp>
+        <p:nvSpPr>
+          <p:cNvPr id="13" name="TextBox 12">
+            <a:extLst>
+              <a:ext uri="{FF2B5EF4-FFF2-40B4-BE49-F238E27FC236}">
+                <a16:creationId xmlns:a16="http://schemas.microsoft.com/office/drawing/2014/main" id="{49BAB6AF-47C0-476A-3F2B-9D5A37330C88}"/>
+              </a:ext>
+            </a:extLst>
+          </p:cNvPr>
+          <p:cNvSpPr txBox="1"/>
+          <p:nvPr/>
+        </p:nvSpPr>
+        <p:spPr>
+          <a:xfrm>
+            <a:off x="5680881" y="7827328"/>
+            <a:ext cx="6093724" cy="1200329"/>
+          </a:xfrm>
+          <a:prstGeom prst="rect">
+            <a:avLst/>
+          </a:prstGeom>
+          <a:noFill/>
+        </p:spPr>
+        <p:txBody>
+          <a:bodyPr wrap="square">
+            <a:spAutoFit/>
+          </a:bodyPr>
+          <a:lstStyle/>
+          <a:p>
+            <a:r>
+              <a:rPr lang="en-US" dirty="0"/>
+              <a:t>The kappa coefficient measures the agreement between classification and truth values. A kappa value of 1 represents perfect agreement, while a value of 0 represents no agreement.</a:t>
+            </a:r>
+          </a:p>
+        </p:txBody>
+      </p:sp>
+      <p:pic>
+        <p:nvPicPr>
+          <p:cNvPr id="10" name="Picture 9" descr="Diagram&#10;&#10;Description automatically generated">
+            <a:extLst>
+              <a:ext uri="{FF2B5EF4-FFF2-40B4-BE49-F238E27FC236}">
+                <a16:creationId xmlns:a16="http://schemas.microsoft.com/office/drawing/2014/main" id="{0283BF2E-A5A2-36CC-3357-79E13565A520}"/>
+              </a:ext>
+            </a:extLst>
+          </p:cNvPr>
+          <p:cNvPicPr>
+            <a:picLocks noChangeAspect="1"/>
+          </p:cNvPicPr>
+          <p:nvPr/>
+        </p:nvPicPr>
+        <p:blipFill>
+          <a:blip r:embed="rId5">
+            <a:extLst>
+              <a:ext uri="{28A0092B-C50C-407E-A947-70E740481C1C}">
+                <a14:useLocalDpi xmlns:a14="http://schemas.microsoft.com/office/drawing/2010/main" val="0"/>
+              </a:ext>
+            </a:extLst>
+          </a:blip>
+          <a:stretch>
+            <a:fillRect/>
+          </a:stretch>
+        </p:blipFill>
+        <p:spPr>
+          <a:xfrm>
+            <a:off x="4845661" y="1497882"/>
+            <a:ext cx="7346339" cy="5247384"/>
           </a:xfrm>
           <a:prstGeom prst="rect">
             <a:avLst/>
@@ -9520,7 +10205,7 @@
     </p:spTree>
     <p:extLst>
       <p:ext uri="{BB962C8B-B14F-4D97-AF65-F5344CB8AC3E}">
-        <p14:creationId xmlns:p14="http://schemas.microsoft.com/office/powerpoint/2010/main" val="1751695005"/>
+        <p14:creationId xmlns:p14="http://schemas.microsoft.com/office/powerpoint/2010/main" val="3469126214"/>
       </p:ext>
     </p:extLst>
   </p:cSld>
@@ -9640,6 +10325,207 @@
                   <a:srgbClr val="002060"/>
                 </a:solidFill>
               </a:rPr>
+              <a:t>Classification Tree – Confusion Matrix</a:t>
+            </a:r>
+          </a:p>
+        </p:txBody>
+      </p:sp>
+      <p:cxnSp>
+        <p:nvCxnSpPr>
+          <p:cNvPr id="9" name="Straight Connector 8">
+            <a:extLst>
+              <a:ext uri="{FF2B5EF4-FFF2-40B4-BE49-F238E27FC236}">
+                <a16:creationId xmlns:a16="http://schemas.microsoft.com/office/drawing/2014/main" id="{450EE6D2-7381-B11A-A20A-0D5D0904DD35}"/>
+              </a:ext>
+            </a:extLst>
+          </p:cNvPr>
+          <p:cNvCxnSpPr>
+            <a:cxnSpLocks/>
+          </p:cNvCxnSpPr>
+          <p:nvPr/>
+        </p:nvCxnSpPr>
+        <p:spPr>
+          <a:xfrm>
+            <a:off x="757647" y="1332033"/>
+            <a:ext cx="10659291" cy="0"/>
+          </a:xfrm>
+          <a:prstGeom prst="line">
+            <a:avLst/>
+          </a:prstGeom>
+          <a:ln w="57150">
+            <a:solidFill>
+              <a:srgbClr val="002060"/>
+            </a:solidFill>
+          </a:ln>
+        </p:spPr>
+        <p:style>
+          <a:lnRef idx="1">
+            <a:schemeClr val="accent1"/>
+          </a:lnRef>
+          <a:fillRef idx="0">
+            <a:schemeClr val="accent1"/>
+          </a:fillRef>
+          <a:effectRef idx="0">
+            <a:schemeClr val="accent1"/>
+          </a:effectRef>
+          <a:fontRef idx="minor">
+            <a:schemeClr val="tx1"/>
+          </a:fontRef>
+        </p:style>
+      </p:cxnSp>
+      <p:pic>
+        <p:nvPicPr>
+          <p:cNvPr id="3" name="Picture 2">
+            <a:extLst>
+              <a:ext uri="{FF2B5EF4-FFF2-40B4-BE49-F238E27FC236}">
+                <a16:creationId xmlns:a16="http://schemas.microsoft.com/office/drawing/2014/main" id="{53197530-2E14-923C-E337-E1922138DA0D}"/>
+              </a:ext>
+            </a:extLst>
+          </p:cNvPr>
+          <p:cNvPicPr>
+            <a:picLocks noChangeAspect="1"/>
+          </p:cNvPicPr>
+          <p:nvPr/>
+        </p:nvPicPr>
+        <p:blipFill>
+          <a:blip r:embed="rId4"/>
+          <a:stretch>
+            <a:fillRect/>
+          </a:stretch>
+        </p:blipFill>
+        <p:spPr>
+          <a:xfrm>
+            <a:off x="4216303" y="1488409"/>
+            <a:ext cx="3759393" cy="5340624"/>
+          </a:xfrm>
+          <a:prstGeom prst="rect">
+            <a:avLst/>
+          </a:prstGeom>
+        </p:spPr>
+      </p:pic>
+    </p:spTree>
+    <p:extLst>
+      <p:ext uri="{BB962C8B-B14F-4D97-AF65-F5344CB8AC3E}">
+        <p14:creationId xmlns:p14="http://schemas.microsoft.com/office/powerpoint/2010/main" val="1751695005"/>
+      </p:ext>
+    </p:extLst>
+  </p:cSld>
+  <p:clrMapOvr>
+    <a:masterClrMapping/>
+  </p:clrMapOvr>
+</p:sld>
+</file>
+
+<file path=ppt/slides/slide27.xml><?xml version="1.0" encoding="utf-8"?>
+<p:sld xmlns:a="http://schemas.openxmlformats.org/drawingml/2006/main" xmlns:r="http://schemas.openxmlformats.org/officeDocument/2006/relationships" xmlns:p="http://schemas.openxmlformats.org/presentationml/2006/main">
+  <p:cSld>
+    <p:spTree>
+      <p:nvGrpSpPr>
+        <p:cNvPr id="1" name=""/>
+        <p:cNvGrpSpPr/>
+        <p:nvPr/>
+      </p:nvGrpSpPr>
+      <p:grpSpPr>
+        <a:xfrm>
+          <a:off x="0" y="0"/>
+          <a:ext cx="0" cy="0"/>
+          <a:chOff x="0" y="0"/>
+          <a:chExt cx="0" cy="0"/>
+        </a:xfrm>
+      </p:grpSpPr>
+      <p:pic>
+        <p:nvPicPr>
+          <p:cNvPr id="5" name="Picture 4">
+            <a:extLst>
+              <a:ext uri="{FF2B5EF4-FFF2-40B4-BE49-F238E27FC236}">
+                <a16:creationId xmlns:a16="http://schemas.microsoft.com/office/drawing/2014/main" id="{558453F9-F3C1-EDA3-6D83-43170A158A07}"/>
+              </a:ext>
+            </a:extLst>
+          </p:cNvPr>
+          <p:cNvPicPr>
+            <a:picLocks noChangeAspect="1"/>
+          </p:cNvPicPr>
+          <p:nvPr/>
+        </p:nvPicPr>
+        <p:blipFill rotWithShape="1">
+          <a:blip r:embed="rId3"/>
+          <a:srcRect t="10770" r="84371" b="20000"/>
+          <a:stretch/>
+        </p:blipFill>
+        <p:spPr>
+          <a:xfrm>
+            <a:off x="0" y="0"/>
+            <a:ext cx="1073997" cy="1175657"/>
+          </a:xfrm>
+          <a:prstGeom prst="rect">
+            <a:avLst/>
+          </a:prstGeom>
+        </p:spPr>
+      </p:pic>
+      <p:pic>
+        <p:nvPicPr>
+          <p:cNvPr id="6" name="Picture 5">
+            <a:extLst>
+              <a:ext uri="{FF2B5EF4-FFF2-40B4-BE49-F238E27FC236}">
+                <a16:creationId xmlns:a16="http://schemas.microsoft.com/office/drawing/2014/main" id="{CE1484BB-74DC-9E65-B32D-BE5FE2E385CD}"/>
+              </a:ext>
+            </a:extLst>
+          </p:cNvPr>
+          <p:cNvPicPr>
+            <a:picLocks noChangeAspect="1"/>
+          </p:cNvPicPr>
+          <p:nvPr/>
+        </p:nvPicPr>
+        <p:blipFill rotWithShape="1">
+          <a:blip r:embed="rId3"/>
+          <a:srcRect l="15172"/>
+          <a:stretch/>
+        </p:blipFill>
+        <p:spPr>
+          <a:xfrm>
+            <a:off x="9949987" y="0"/>
+            <a:ext cx="2242014" cy="653143"/>
+          </a:xfrm>
+          <a:prstGeom prst="rect">
+            <a:avLst/>
+          </a:prstGeom>
+        </p:spPr>
+      </p:pic>
+      <p:sp>
+        <p:nvSpPr>
+          <p:cNvPr id="7" name="TextBox 6">
+            <a:extLst>
+              <a:ext uri="{FF2B5EF4-FFF2-40B4-BE49-F238E27FC236}">
+                <a16:creationId xmlns:a16="http://schemas.microsoft.com/office/drawing/2014/main" id="{9EECCCD9-8AD5-9916-BC29-771066C9EE70}"/>
+              </a:ext>
+            </a:extLst>
+          </p:cNvPr>
+          <p:cNvSpPr txBox="1"/>
+          <p:nvPr/>
+        </p:nvSpPr>
+        <p:spPr>
+          <a:xfrm>
+            <a:off x="1" y="470259"/>
+            <a:ext cx="12192000" cy="861774"/>
+          </a:xfrm>
+          <a:prstGeom prst="rect">
+            <a:avLst/>
+          </a:prstGeom>
+          <a:noFill/>
+        </p:spPr>
+        <p:txBody>
+          <a:bodyPr wrap="square" rtlCol="0">
+            <a:spAutoFit/>
+          </a:bodyPr>
+          <a:lstStyle/>
+          <a:p>
+            <a:pPr algn="ctr"/>
+            <a:r>
+              <a:rPr lang="en-US" sz="5000" b="1" dirty="0">
+                <a:solidFill>
+                  <a:srgbClr val="002060"/>
+                </a:solidFill>
+              </a:rPr>
               <a:t>Classification Tree – ROC Curve</a:t>
             </a:r>
           </a:p>
@@ -9772,7 +10658,7 @@
 </p:sld>
 </file>
 
-<file path=ppt/slides/slide27.xml><?xml version="1.0" encoding="utf-8"?>
+<file path=ppt/slides/slide28.xml><?xml version="1.0" encoding="utf-8"?>
 <p:sld xmlns:a="http://schemas.openxmlformats.org/drawingml/2006/main" xmlns:r="http://schemas.openxmlformats.org/officeDocument/2006/relationships" xmlns:p="http://schemas.openxmlformats.org/presentationml/2006/main">
   <p:cSld>
     <p:spTree>
@@ -10513,7 +11399,7 @@
 </p:sld>
 </file>
 
-<file path=ppt/slides/slide28.xml><?xml version="1.0" encoding="utf-8"?>
+<file path=ppt/slides/slide29.xml><?xml version="1.0" encoding="utf-8"?>
 <p:sld xmlns:a="http://schemas.openxmlformats.org/drawingml/2006/main" xmlns:r="http://schemas.openxmlformats.org/officeDocument/2006/relationships" xmlns:p="http://schemas.openxmlformats.org/presentationml/2006/main">
   <p:cSld>
     <p:bg>

</xml_diff>